<commit_message>
Updated PPTX files, altered some of the course to clean up the flow
</commit_message>
<xml_diff>
--- a/Section 1- Intro to DevOps/1.1IntroDatabaseDevOps.pptx
+++ b/Section 1- Intro to DevOps/1.1IntroDatabaseDevOps.pptx
@@ -4,17 +4,41 @@
   <p:sldMasterIdLst>
     <p:sldMasterId id="2147483648" r:id="rId1"/>
   </p:sldMasterIdLst>
+  <p:notesMasterIdLst>
+    <p:notesMasterId r:id="rId33"/>
+  </p:notesMasterIdLst>
   <p:sldIdLst>
     <p:sldId id="256" r:id="rId2"/>
-    <p:sldId id="257" r:id="rId3"/>
-    <p:sldId id="259" r:id="rId4"/>
-    <p:sldId id="258" r:id="rId5"/>
-    <p:sldId id="261" r:id="rId6"/>
-    <p:sldId id="260" r:id="rId7"/>
-    <p:sldId id="262" r:id="rId8"/>
-    <p:sldId id="263" r:id="rId9"/>
-    <p:sldId id="264" r:id="rId10"/>
-    <p:sldId id="265" r:id="rId11"/>
+    <p:sldId id="266" r:id="rId3"/>
+    <p:sldId id="268" r:id="rId4"/>
+    <p:sldId id="269" r:id="rId5"/>
+    <p:sldId id="259" r:id="rId6"/>
+    <p:sldId id="257" r:id="rId7"/>
+    <p:sldId id="267" r:id="rId8"/>
+    <p:sldId id="258" r:id="rId9"/>
+    <p:sldId id="261" r:id="rId10"/>
+    <p:sldId id="260" r:id="rId11"/>
+    <p:sldId id="270" r:id="rId12"/>
+    <p:sldId id="271" r:id="rId13"/>
+    <p:sldId id="272" r:id="rId14"/>
+    <p:sldId id="265" r:id="rId15"/>
+    <p:sldId id="273" r:id="rId16"/>
+    <p:sldId id="274" r:id="rId17"/>
+    <p:sldId id="276" r:id="rId18"/>
+    <p:sldId id="275" r:id="rId19"/>
+    <p:sldId id="277" r:id="rId20"/>
+    <p:sldId id="285" r:id="rId21"/>
+    <p:sldId id="278" r:id="rId22"/>
+    <p:sldId id="280" r:id="rId23"/>
+    <p:sldId id="279" r:id="rId24"/>
+    <p:sldId id="281" r:id="rId25"/>
+    <p:sldId id="282" r:id="rId26"/>
+    <p:sldId id="283" r:id="rId27"/>
+    <p:sldId id="284" r:id="rId28"/>
+    <p:sldId id="286" r:id="rId29"/>
+    <p:sldId id="287" r:id="rId30"/>
+    <p:sldId id="288" r:id="rId31"/>
+    <p:sldId id="289" r:id="rId32"/>
   </p:sldIdLst>
   <p:sldSz cx="12192000" cy="6858000"/>
   <p:notesSz cx="6858000" cy="9144000"/>
@@ -121,6 +145,454 @@
 </p:presentation>
 </file>
 
+<file path=ppt/notesMasters/notesMaster1.xml><?xml version="1.0" encoding="utf-8"?>
+<p:notesMaster xmlns:a="http://schemas.openxmlformats.org/drawingml/2006/main" xmlns:r="http://schemas.openxmlformats.org/officeDocument/2006/relationships" xmlns:p="http://schemas.openxmlformats.org/presentationml/2006/main">
+  <p:cSld>
+    <p:bg>
+      <p:bgRef idx="1001">
+        <a:schemeClr val="bg1"/>
+      </p:bgRef>
+    </p:bg>
+    <p:spTree>
+      <p:nvGrpSpPr>
+        <p:cNvPr id="1" name=""/>
+        <p:cNvGrpSpPr/>
+        <p:nvPr/>
+      </p:nvGrpSpPr>
+      <p:grpSpPr>
+        <a:xfrm>
+          <a:off x="0" y="0"/>
+          <a:ext cx="0" cy="0"/>
+          <a:chOff x="0" y="0"/>
+          <a:chExt cx="0" cy="0"/>
+        </a:xfrm>
+      </p:grpSpPr>
+      <p:sp>
+        <p:nvSpPr>
+          <p:cNvPr id="2" name="Header Placeholder 1"/>
+          <p:cNvSpPr>
+            <a:spLocks noGrp="1"/>
+          </p:cNvSpPr>
+          <p:nvPr>
+            <p:ph type="hdr" sz="quarter"/>
+          </p:nvPr>
+        </p:nvSpPr>
+        <p:spPr>
+          <a:xfrm>
+            <a:off x="0" y="0"/>
+            <a:ext cx="2971800" cy="458788"/>
+          </a:xfrm>
+          <a:prstGeom prst="rect">
+            <a:avLst/>
+          </a:prstGeom>
+        </p:spPr>
+        <p:txBody>
+          <a:bodyPr vert="horz" lIns="91440" tIns="45720" rIns="91440" bIns="45720" rtlCol="0"/>
+          <a:lstStyle>
+            <a:lvl1pPr algn="l">
+              <a:defRPr sz="1200"/>
+            </a:lvl1pPr>
+          </a:lstStyle>
+          <a:p>
+            <a:endParaRPr lang="en-US"/>
+          </a:p>
+        </p:txBody>
+      </p:sp>
+      <p:sp>
+        <p:nvSpPr>
+          <p:cNvPr id="3" name="Date Placeholder 2"/>
+          <p:cNvSpPr>
+            <a:spLocks noGrp="1"/>
+          </p:cNvSpPr>
+          <p:nvPr>
+            <p:ph type="dt" idx="1"/>
+          </p:nvPr>
+        </p:nvSpPr>
+        <p:spPr>
+          <a:xfrm>
+            <a:off x="3884613" y="0"/>
+            <a:ext cx="2971800" cy="458788"/>
+          </a:xfrm>
+          <a:prstGeom prst="rect">
+            <a:avLst/>
+          </a:prstGeom>
+        </p:spPr>
+        <p:txBody>
+          <a:bodyPr vert="horz" lIns="91440" tIns="45720" rIns="91440" bIns="45720" rtlCol="0"/>
+          <a:lstStyle>
+            <a:lvl1pPr algn="r">
+              <a:defRPr sz="1200"/>
+            </a:lvl1pPr>
+          </a:lstStyle>
+          <a:p>
+            <a:fld id="{B6492822-2C9D-4185-9041-FF2754FD057B}" type="datetimeFigureOut">
+              <a:rPr lang="en-US" smtClean="0"/>
+              <a:t>3/17/2017</a:t>
+            </a:fld>
+            <a:endParaRPr lang="en-US"/>
+          </a:p>
+        </p:txBody>
+      </p:sp>
+      <p:sp>
+        <p:nvSpPr>
+          <p:cNvPr id="4" name="Slide Image Placeholder 3"/>
+          <p:cNvSpPr>
+            <a:spLocks noGrp="1" noRot="1" noChangeAspect="1"/>
+          </p:cNvSpPr>
+          <p:nvPr>
+            <p:ph type="sldImg" idx="2"/>
+          </p:nvPr>
+        </p:nvSpPr>
+        <p:spPr>
+          <a:xfrm>
+            <a:off x="685800" y="1143000"/>
+            <a:ext cx="5486400" cy="3086100"/>
+          </a:xfrm>
+          <a:prstGeom prst="rect">
+            <a:avLst/>
+          </a:prstGeom>
+          <a:noFill/>
+          <a:ln w="12700">
+            <a:solidFill>
+              <a:prstClr val="black"/>
+            </a:solidFill>
+          </a:ln>
+        </p:spPr>
+        <p:txBody>
+          <a:bodyPr vert="horz" lIns="91440" tIns="45720" rIns="91440" bIns="45720" rtlCol="0" anchor="ctr"/>
+          <a:lstStyle/>
+          <a:p>
+            <a:endParaRPr lang="en-US"/>
+          </a:p>
+        </p:txBody>
+      </p:sp>
+      <p:sp>
+        <p:nvSpPr>
+          <p:cNvPr id="5" name="Notes Placeholder 4"/>
+          <p:cNvSpPr>
+            <a:spLocks noGrp="1"/>
+          </p:cNvSpPr>
+          <p:nvPr>
+            <p:ph type="body" sz="quarter" idx="3"/>
+          </p:nvPr>
+        </p:nvSpPr>
+        <p:spPr>
+          <a:xfrm>
+            <a:off x="685800" y="4400550"/>
+            <a:ext cx="5486400" cy="3600450"/>
+          </a:xfrm>
+          <a:prstGeom prst="rect">
+            <a:avLst/>
+          </a:prstGeom>
+        </p:spPr>
+        <p:txBody>
+          <a:bodyPr vert="horz" lIns="91440" tIns="45720" rIns="91440" bIns="45720" rtlCol="0"/>
+          <a:lstStyle/>
+          <a:p>
+            <a:pPr lvl="0"/>
+            <a:r>
+              <a:rPr lang="en-US"/>
+              <a:t>Edit Master text styles</a:t>
+            </a:r>
+          </a:p>
+          <a:p>
+            <a:pPr lvl="1"/>
+            <a:r>
+              <a:rPr lang="en-US"/>
+              <a:t>Second level</a:t>
+            </a:r>
+          </a:p>
+          <a:p>
+            <a:pPr lvl="2"/>
+            <a:r>
+              <a:rPr lang="en-US"/>
+              <a:t>Third level</a:t>
+            </a:r>
+          </a:p>
+          <a:p>
+            <a:pPr lvl="3"/>
+            <a:r>
+              <a:rPr lang="en-US"/>
+              <a:t>Fourth level</a:t>
+            </a:r>
+          </a:p>
+          <a:p>
+            <a:pPr lvl="4"/>
+            <a:r>
+              <a:rPr lang="en-US"/>
+              <a:t>Fifth level</a:t>
+            </a:r>
+            <a:endParaRPr lang="en-US"/>
+          </a:p>
+        </p:txBody>
+      </p:sp>
+      <p:sp>
+        <p:nvSpPr>
+          <p:cNvPr id="6" name="Footer Placeholder 5"/>
+          <p:cNvSpPr>
+            <a:spLocks noGrp="1"/>
+          </p:cNvSpPr>
+          <p:nvPr>
+            <p:ph type="ftr" sz="quarter" idx="4"/>
+          </p:nvPr>
+        </p:nvSpPr>
+        <p:spPr>
+          <a:xfrm>
+            <a:off x="0" y="8685213"/>
+            <a:ext cx="2971800" cy="458787"/>
+          </a:xfrm>
+          <a:prstGeom prst="rect">
+            <a:avLst/>
+          </a:prstGeom>
+        </p:spPr>
+        <p:txBody>
+          <a:bodyPr vert="horz" lIns="91440" tIns="45720" rIns="91440" bIns="45720" rtlCol="0" anchor="b"/>
+          <a:lstStyle>
+            <a:lvl1pPr algn="l">
+              <a:defRPr sz="1200"/>
+            </a:lvl1pPr>
+          </a:lstStyle>
+          <a:p>
+            <a:endParaRPr lang="en-US"/>
+          </a:p>
+        </p:txBody>
+      </p:sp>
+      <p:sp>
+        <p:nvSpPr>
+          <p:cNvPr id="7" name="Slide Number Placeholder 6"/>
+          <p:cNvSpPr>
+            <a:spLocks noGrp="1"/>
+          </p:cNvSpPr>
+          <p:nvPr>
+            <p:ph type="sldNum" sz="quarter" idx="5"/>
+          </p:nvPr>
+        </p:nvSpPr>
+        <p:spPr>
+          <a:xfrm>
+            <a:off x="3884613" y="8685213"/>
+            <a:ext cx="2971800" cy="458787"/>
+          </a:xfrm>
+          <a:prstGeom prst="rect">
+            <a:avLst/>
+          </a:prstGeom>
+        </p:spPr>
+        <p:txBody>
+          <a:bodyPr vert="horz" lIns="91440" tIns="45720" rIns="91440" bIns="45720" rtlCol="0" anchor="b"/>
+          <a:lstStyle>
+            <a:lvl1pPr algn="r">
+              <a:defRPr sz="1200"/>
+            </a:lvl1pPr>
+          </a:lstStyle>
+          <a:p>
+            <a:fld id="{64DD074E-609A-4698-9672-A1E23FEB6EEB}" type="slidenum">
+              <a:rPr lang="en-US" smtClean="0"/>
+              <a:t>‹#›</a:t>
+            </a:fld>
+            <a:endParaRPr lang="en-US"/>
+          </a:p>
+        </p:txBody>
+      </p:sp>
+    </p:spTree>
+    <p:extLst>
+      <p:ext uri="{BB962C8B-B14F-4D97-AF65-F5344CB8AC3E}">
+        <p14:creationId xmlns:p14="http://schemas.microsoft.com/office/powerpoint/2010/main" val="2935385695"/>
+      </p:ext>
+    </p:extLst>
+  </p:cSld>
+  <p:clrMap bg1="lt1" tx1="dk1" bg2="lt2" tx2="dk2" accent1="accent1" accent2="accent2" accent3="accent3" accent4="accent4" accent5="accent5" accent6="accent6" hlink="hlink" folHlink="folHlink"/>
+  <p:notesStyle>
+    <a:lvl1pPr marL="0" algn="l" defTabSz="914400" rtl="0" eaLnBrk="1" latinLnBrk="0" hangingPunct="1">
+      <a:defRPr sz="1200" kern="1200">
+        <a:solidFill>
+          <a:schemeClr val="tx1"/>
+        </a:solidFill>
+        <a:latin typeface="+mn-lt"/>
+        <a:ea typeface="+mn-ea"/>
+        <a:cs typeface="+mn-cs"/>
+      </a:defRPr>
+    </a:lvl1pPr>
+    <a:lvl2pPr marL="457200" algn="l" defTabSz="914400" rtl="0" eaLnBrk="1" latinLnBrk="0" hangingPunct="1">
+      <a:defRPr sz="1200" kern="1200">
+        <a:solidFill>
+          <a:schemeClr val="tx1"/>
+        </a:solidFill>
+        <a:latin typeface="+mn-lt"/>
+        <a:ea typeface="+mn-ea"/>
+        <a:cs typeface="+mn-cs"/>
+      </a:defRPr>
+    </a:lvl2pPr>
+    <a:lvl3pPr marL="914400" algn="l" defTabSz="914400" rtl="0" eaLnBrk="1" latinLnBrk="0" hangingPunct="1">
+      <a:defRPr sz="1200" kern="1200">
+        <a:solidFill>
+          <a:schemeClr val="tx1"/>
+        </a:solidFill>
+        <a:latin typeface="+mn-lt"/>
+        <a:ea typeface="+mn-ea"/>
+        <a:cs typeface="+mn-cs"/>
+      </a:defRPr>
+    </a:lvl3pPr>
+    <a:lvl4pPr marL="1371600" algn="l" defTabSz="914400" rtl="0" eaLnBrk="1" latinLnBrk="0" hangingPunct="1">
+      <a:defRPr sz="1200" kern="1200">
+        <a:solidFill>
+          <a:schemeClr val="tx1"/>
+        </a:solidFill>
+        <a:latin typeface="+mn-lt"/>
+        <a:ea typeface="+mn-ea"/>
+        <a:cs typeface="+mn-cs"/>
+      </a:defRPr>
+    </a:lvl4pPr>
+    <a:lvl5pPr marL="1828800" algn="l" defTabSz="914400" rtl="0" eaLnBrk="1" latinLnBrk="0" hangingPunct="1">
+      <a:defRPr sz="1200" kern="1200">
+        <a:solidFill>
+          <a:schemeClr val="tx1"/>
+        </a:solidFill>
+        <a:latin typeface="+mn-lt"/>
+        <a:ea typeface="+mn-ea"/>
+        <a:cs typeface="+mn-cs"/>
+      </a:defRPr>
+    </a:lvl5pPr>
+    <a:lvl6pPr marL="2286000" algn="l" defTabSz="914400" rtl="0" eaLnBrk="1" latinLnBrk="0" hangingPunct="1">
+      <a:defRPr sz="1200" kern="1200">
+        <a:solidFill>
+          <a:schemeClr val="tx1"/>
+        </a:solidFill>
+        <a:latin typeface="+mn-lt"/>
+        <a:ea typeface="+mn-ea"/>
+        <a:cs typeface="+mn-cs"/>
+      </a:defRPr>
+    </a:lvl6pPr>
+    <a:lvl7pPr marL="2743200" algn="l" defTabSz="914400" rtl="0" eaLnBrk="1" latinLnBrk="0" hangingPunct="1">
+      <a:defRPr sz="1200" kern="1200">
+        <a:solidFill>
+          <a:schemeClr val="tx1"/>
+        </a:solidFill>
+        <a:latin typeface="+mn-lt"/>
+        <a:ea typeface="+mn-ea"/>
+        <a:cs typeface="+mn-cs"/>
+      </a:defRPr>
+    </a:lvl7pPr>
+    <a:lvl8pPr marL="3200400" algn="l" defTabSz="914400" rtl="0" eaLnBrk="1" latinLnBrk="0" hangingPunct="1">
+      <a:defRPr sz="1200" kern="1200">
+        <a:solidFill>
+          <a:schemeClr val="tx1"/>
+        </a:solidFill>
+        <a:latin typeface="+mn-lt"/>
+        <a:ea typeface="+mn-ea"/>
+        <a:cs typeface="+mn-cs"/>
+      </a:defRPr>
+    </a:lvl8pPr>
+    <a:lvl9pPr marL="3657600" algn="l" defTabSz="914400" rtl="0" eaLnBrk="1" latinLnBrk="0" hangingPunct="1">
+      <a:defRPr sz="1200" kern="1200">
+        <a:solidFill>
+          <a:schemeClr val="tx1"/>
+        </a:solidFill>
+        <a:latin typeface="+mn-lt"/>
+        <a:ea typeface="+mn-ea"/>
+        <a:cs typeface="+mn-cs"/>
+      </a:defRPr>
+    </a:lvl9pPr>
+  </p:notesStyle>
+</p:notesMaster>
+</file>
+
+<file path=ppt/notesSlides/notesSlide1.xml><?xml version="1.0" encoding="utf-8"?>
+<p:notes xmlns:a="http://schemas.openxmlformats.org/drawingml/2006/main" xmlns:r="http://schemas.openxmlformats.org/officeDocument/2006/relationships" xmlns:p="http://schemas.openxmlformats.org/presentationml/2006/main">
+  <p:cSld>
+    <p:spTree>
+      <p:nvGrpSpPr>
+        <p:cNvPr id="1" name=""/>
+        <p:cNvGrpSpPr/>
+        <p:nvPr/>
+      </p:nvGrpSpPr>
+      <p:grpSpPr>
+        <a:xfrm>
+          <a:off x="0" y="0"/>
+          <a:ext cx="0" cy="0"/>
+          <a:chOff x="0" y="0"/>
+          <a:chExt cx="0" cy="0"/>
+        </a:xfrm>
+      </p:grpSpPr>
+      <p:sp>
+        <p:nvSpPr>
+          <p:cNvPr id="2" name="Slide Image Placeholder 1"/>
+          <p:cNvSpPr>
+            <a:spLocks noGrp="1" noRot="1" noChangeAspect="1"/>
+          </p:cNvSpPr>
+          <p:nvPr>
+            <p:ph type="sldImg"/>
+          </p:nvPr>
+        </p:nvSpPr>
+        <p:spPr>
+          <a:xfrm>
+            <a:off x="685800" y="1143000"/>
+            <a:ext cx="5486400" cy="3086100"/>
+          </a:xfrm>
+        </p:spPr>
+      </p:sp>
+      <p:sp>
+        <p:nvSpPr>
+          <p:cNvPr id="3" name="Notes Placeholder 2"/>
+          <p:cNvSpPr>
+            <a:spLocks noGrp="1"/>
+          </p:cNvSpPr>
+          <p:nvPr>
+            <p:ph type="body" idx="1"/>
+          </p:nvPr>
+        </p:nvSpPr>
+        <p:spPr/>
+        <p:txBody>
+          <a:bodyPr/>
+          <a:lstStyle/>
+          <a:p>
+            <a:endParaRPr lang="en-US" dirty="0"/>
+          </a:p>
+        </p:txBody>
+      </p:sp>
+      <p:sp>
+        <p:nvSpPr>
+          <p:cNvPr id="4" name="Slide Number Placeholder 3"/>
+          <p:cNvSpPr>
+            <a:spLocks noGrp="1"/>
+          </p:cNvSpPr>
+          <p:nvPr>
+            <p:ph type="sldNum" sz="quarter" idx="10"/>
+          </p:nvPr>
+        </p:nvSpPr>
+        <p:spPr/>
+        <p:txBody>
+          <a:bodyPr/>
+          <a:lstStyle/>
+          <a:p>
+            <a:fld id="{D967BA51-0EB4-4220-BB57-0E06A05A64BC}" type="slidenum">
+              <a:rPr lang="en-GB" smtClean="0">
+                <a:solidFill>
+                  <a:prstClr val="black"/>
+                </a:solidFill>
+              </a:rPr>
+              <a:pPr/>
+              <a:t>4</a:t>
+            </a:fld>
+            <a:endParaRPr lang="en-GB" dirty="0">
+              <a:solidFill>
+                <a:prstClr val="black"/>
+              </a:solidFill>
+            </a:endParaRPr>
+          </a:p>
+        </p:txBody>
+      </p:sp>
+    </p:spTree>
+    <p:extLst>
+      <p:ext uri="{BB962C8B-B14F-4D97-AF65-F5344CB8AC3E}">
+        <p14:creationId xmlns:p14="http://schemas.microsoft.com/office/powerpoint/2010/main" val="4176032075"/>
+      </p:ext>
+    </p:extLst>
+  </p:cSld>
+  <p:clrMapOvr>
+    <a:masterClrMapping/>
+  </p:clrMapOvr>
+</p:notes>
+</file>
+
 <file path=ppt/slideLayouts/slideLayout1.xml><?xml version="1.0" encoding="utf-8"?>
 <p:sldLayout xmlns:a="http://schemas.openxmlformats.org/drawingml/2006/main" xmlns:r="http://schemas.openxmlformats.org/officeDocument/2006/relationships" xmlns:p="http://schemas.openxmlformats.org/presentationml/2006/main" type="title" preserve="1">
   <p:cSld name="Title Slide">
@@ -250,7 +722,7 @@
           <a:p>
             <a:fld id="{2402ECA0-9BE0-424F-B302-B69C667DF220}" type="datetimeFigureOut">
               <a:rPr lang="en-US" smtClean="0"/>
-              <a:t>3/14/2017</a:t>
+              <a:t>3/17/2017</a:t>
             </a:fld>
             <a:endParaRPr lang="en-US"/>
           </a:p>
@@ -418,7 +890,7 @@
           <a:p>
             <a:fld id="{2402ECA0-9BE0-424F-B302-B69C667DF220}" type="datetimeFigureOut">
               <a:rPr lang="en-US" smtClean="0"/>
-              <a:t>3/14/2017</a:t>
+              <a:t>3/17/2017</a:t>
             </a:fld>
             <a:endParaRPr lang="en-US"/>
           </a:p>
@@ -596,7 +1068,7 @@
           <a:p>
             <a:fld id="{2402ECA0-9BE0-424F-B302-B69C667DF220}" type="datetimeFigureOut">
               <a:rPr lang="en-US" smtClean="0"/>
-              <a:t>3/14/2017</a:t>
+              <a:t>3/17/2017</a:t>
             </a:fld>
             <a:endParaRPr lang="en-US"/>
           </a:p>
@@ -764,7 +1236,7 @@
           <a:p>
             <a:fld id="{2402ECA0-9BE0-424F-B302-B69C667DF220}" type="datetimeFigureOut">
               <a:rPr lang="en-US" smtClean="0"/>
-              <a:t>3/14/2017</a:t>
+              <a:t>3/17/2017</a:t>
             </a:fld>
             <a:endParaRPr lang="en-US"/>
           </a:p>
@@ -1009,7 +1481,7 @@
           <a:p>
             <a:fld id="{2402ECA0-9BE0-424F-B302-B69C667DF220}" type="datetimeFigureOut">
               <a:rPr lang="en-US" smtClean="0"/>
-              <a:t>3/14/2017</a:t>
+              <a:t>3/17/2017</a:t>
             </a:fld>
             <a:endParaRPr lang="en-US"/>
           </a:p>
@@ -1238,7 +1710,7 @@
           <a:p>
             <a:fld id="{2402ECA0-9BE0-424F-B302-B69C667DF220}" type="datetimeFigureOut">
               <a:rPr lang="en-US" smtClean="0"/>
-              <a:t>3/14/2017</a:t>
+              <a:t>3/17/2017</a:t>
             </a:fld>
             <a:endParaRPr lang="en-US"/>
           </a:p>
@@ -1602,7 +2074,7 @@
           <a:p>
             <a:fld id="{2402ECA0-9BE0-424F-B302-B69C667DF220}" type="datetimeFigureOut">
               <a:rPr lang="en-US" smtClean="0"/>
-              <a:t>3/14/2017</a:t>
+              <a:t>3/17/2017</a:t>
             </a:fld>
             <a:endParaRPr lang="en-US"/>
           </a:p>
@@ -1719,7 +2191,7 @@
           <a:p>
             <a:fld id="{2402ECA0-9BE0-424F-B302-B69C667DF220}" type="datetimeFigureOut">
               <a:rPr lang="en-US" smtClean="0"/>
-              <a:t>3/14/2017</a:t>
+              <a:t>3/17/2017</a:t>
             </a:fld>
             <a:endParaRPr lang="en-US"/>
           </a:p>
@@ -1814,7 +2286,7 @@
           <a:p>
             <a:fld id="{2402ECA0-9BE0-424F-B302-B69C667DF220}" type="datetimeFigureOut">
               <a:rPr lang="en-US" smtClean="0"/>
-              <a:t>3/14/2017</a:t>
+              <a:t>3/17/2017</a:t>
             </a:fld>
             <a:endParaRPr lang="en-US"/>
           </a:p>
@@ -2089,7 +2561,7 @@
           <a:p>
             <a:fld id="{2402ECA0-9BE0-424F-B302-B69C667DF220}" type="datetimeFigureOut">
               <a:rPr lang="en-US" smtClean="0"/>
-              <a:t>3/14/2017</a:t>
+              <a:t>3/17/2017</a:t>
             </a:fld>
             <a:endParaRPr lang="en-US"/>
           </a:p>
@@ -2341,7 +2813,7 @@
           <a:p>
             <a:fld id="{2402ECA0-9BE0-424F-B302-B69C667DF220}" type="datetimeFigureOut">
               <a:rPr lang="en-US" smtClean="0"/>
-              <a:t>3/14/2017</a:t>
+              <a:t>3/17/2017</a:t>
             </a:fld>
             <a:endParaRPr lang="en-US"/>
           </a:p>
@@ -2552,7 +3024,7 @@
           <a:p>
             <a:fld id="{2402ECA0-9BE0-424F-B302-B69C667DF220}" type="datetimeFigureOut">
               <a:rPr lang="en-US" smtClean="0"/>
-              <a:t>3/14/2017</a:t>
+              <a:t>3/17/2017</a:t>
             </a:fld>
             <a:endParaRPr lang="en-US"/>
           </a:p>
@@ -3031,6 +3503,313 @@
           <a:chExt cx="0" cy="0"/>
         </a:xfrm>
       </p:grpSpPr>
+      <p:sp>
+        <p:nvSpPr>
+          <p:cNvPr id="2" name="Title 1"/>
+          <p:cNvSpPr>
+            <a:spLocks noGrp="1"/>
+          </p:cNvSpPr>
+          <p:nvPr>
+            <p:ph type="title"/>
+          </p:nvPr>
+        </p:nvSpPr>
+        <p:spPr/>
+        <p:txBody>
+          <a:bodyPr/>
+          <a:lstStyle/>
+          <a:p>
+            <a:r>
+              <a:rPr lang="en-US" dirty="0"/>
+              <a:t>The Three Ways</a:t>
+            </a:r>
+          </a:p>
+        </p:txBody>
+      </p:sp>
+      <p:sp>
+        <p:nvSpPr>
+          <p:cNvPr id="3" name="Content Placeholder 2"/>
+          <p:cNvSpPr>
+            <a:spLocks noGrp="1"/>
+          </p:cNvSpPr>
+          <p:nvPr>
+            <p:ph idx="1"/>
+          </p:nvPr>
+        </p:nvSpPr>
+        <p:spPr/>
+        <p:txBody>
+          <a:bodyPr/>
+          <a:lstStyle/>
+          <a:p>
+            <a:r>
+              <a:rPr lang="en-US" dirty="0"/>
+              <a:t>Gene Kim of The Phoenix Project and The DevOps Handbook, lists three core principles of DevOps</a:t>
+            </a:r>
+          </a:p>
+          <a:p>
+            <a:pPr lvl="1"/>
+            <a:r>
+              <a:rPr lang="en-US" dirty="0"/>
+              <a:t>Systems Thinking</a:t>
+            </a:r>
+          </a:p>
+          <a:p>
+            <a:pPr lvl="1"/>
+            <a:r>
+              <a:rPr lang="en-US" dirty="0"/>
+              <a:t>Feedback Loops</a:t>
+            </a:r>
+          </a:p>
+          <a:p>
+            <a:pPr lvl="1"/>
+            <a:r>
+              <a:rPr lang="en-US" dirty="0"/>
+              <a:t>Culture of Continuous Learning and Experimentation</a:t>
+            </a:r>
+          </a:p>
+          <a:p>
+            <a:endParaRPr lang="en-US" dirty="0"/>
+          </a:p>
+        </p:txBody>
+      </p:sp>
+    </p:spTree>
+    <p:extLst>
+      <p:ext uri="{BB962C8B-B14F-4D97-AF65-F5344CB8AC3E}">
+        <p14:creationId xmlns:p14="http://schemas.microsoft.com/office/powerpoint/2010/main" val="2497169468"/>
+      </p:ext>
+    </p:extLst>
+  </p:cSld>
+  <p:clrMapOvr>
+    <a:masterClrMapping/>
+  </p:clrMapOvr>
+</p:sld>
+</file>
+
+<file path=ppt/slides/slide11.xml><?xml version="1.0" encoding="utf-8"?>
+<p:sld xmlns:a="http://schemas.openxmlformats.org/drawingml/2006/main" xmlns:r="http://schemas.openxmlformats.org/officeDocument/2006/relationships" xmlns:p="http://schemas.openxmlformats.org/presentationml/2006/main">
+  <p:cSld>
+    <p:spTree>
+      <p:nvGrpSpPr>
+        <p:cNvPr id="1" name=""/>
+        <p:cNvGrpSpPr/>
+        <p:nvPr/>
+      </p:nvGrpSpPr>
+      <p:grpSpPr>
+        <a:xfrm>
+          <a:off x="0" y="0"/>
+          <a:ext cx="0" cy="0"/>
+          <a:chOff x="0" y="0"/>
+          <a:chExt cx="0" cy="0"/>
+        </a:xfrm>
+      </p:grpSpPr>
+      <p:pic>
+        <p:nvPicPr>
+          <p:cNvPr id="4" name="Picture 2" descr="http://itrevolution.com/wp-content/uploads/2012/08/first-way2-400x191.png">
+            <a:hlinkClick r:id="rId2"/>
+          </p:cNvPr>
+          <p:cNvPicPr>
+            <a:picLocks noChangeAspect="1" noChangeArrowheads="1"/>
+          </p:cNvPicPr>
+          <p:nvPr/>
+        </p:nvPicPr>
+        <p:blipFill rotWithShape="1">
+          <a:blip r:embed="rId3">
+            <a:extLst>
+              <a:ext uri="{28A0092B-C50C-407E-A947-70E740481C1C}">
+                <a14:useLocalDpi xmlns:a14="http://schemas.microsoft.com/office/drawing/2010/main" val="0"/>
+              </a:ext>
+            </a:extLst>
+          </a:blip>
+          <a:srcRect/>
+          <a:stretch/>
+        </p:blipFill>
+        <p:spPr bwMode="auto">
+          <a:xfrm>
+            <a:off x="1274217" y="1123527"/>
+            <a:ext cx="9643560" cy="4604800"/>
+          </a:xfrm>
+          <a:prstGeom prst="rect">
+            <a:avLst/>
+          </a:prstGeom>
+          <a:noFill/>
+          <a:extLst>
+            <a:ext uri="{909E8E84-426E-40DD-AFC4-6F175D3DCCD1}">
+              <a14:hiddenFill xmlns:a14="http://schemas.microsoft.com/office/drawing/2010/main">
+                <a:solidFill>
+                  <a:srgbClr val="FFFFFF"/>
+                </a:solidFill>
+              </a14:hiddenFill>
+            </a:ext>
+          </a:extLst>
+        </p:spPr>
+      </p:pic>
+    </p:spTree>
+    <p:extLst>
+      <p:ext uri="{BB962C8B-B14F-4D97-AF65-F5344CB8AC3E}">
+        <p14:creationId xmlns:p14="http://schemas.microsoft.com/office/powerpoint/2010/main" val="1005031175"/>
+      </p:ext>
+    </p:extLst>
+  </p:cSld>
+  <p:clrMapOvr>
+    <a:masterClrMapping/>
+  </p:clrMapOvr>
+</p:sld>
+</file>
+
+<file path=ppt/slides/slide12.xml><?xml version="1.0" encoding="utf-8"?>
+<p:sld xmlns:a="http://schemas.openxmlformats.org/drawingml/2006/main" xmlns:r="http://schemas.openxmlformats.org/officeDocument/2006/relationships" xmlns:p="http://schemas.openxmlformats.org/presentationml/2006/main">
+  <p:cSld>
+    <p:spTree>
+      <p:nvGrpSpPr>
+        <p:cNvPr id="1" name=""/>
+        <p:cNvGrpSpPr/>
+        <p:nvPr/>
+      </p:nvGrpSpPr>
+      <p:grpSpPr>
+        <a:xfrm>
+          <a:off x="0" y="0"/>
+          <a:ext cx="0" cy="0"/>
+          <a:chOff x="0" y="0"/>
+          <a:chExt cx="0" cy="0"/>
+        </a:xfrm>
+      </p:grpSpPr>
+      <p:pic>
+        <p:nvPicPr>
+          <p:cNvPr id="2" name="Picture 2" descr="http://itrevolution.com/wp-content/uploads/2012/08/second-way1-400x211.png"/>
+          <p:cNvPicPr>
+            <a:picLocks noChangeAspect="1" noChangeArrowheads="1"/>
+          </p:cNvPicPr>
+          <p:nvPr/>
+        </p:nvPicPr>
+        <p:blipFill rotWithShape="1">
+          <a:blip r:embed="rId2">
+            <a:extLst>
+              <a:ext uri="{28A0092B-C50C-407E-A947-70E740481C1C}">
+                <a14:useLocalDpi xmlns:a14="http://schemas.microsoft.com/office/drawing/2010/main" val="0"/>
+              </a:ext>
+            </a:extLst>
+          </a:blip>
+          <a:srcRect/>
+          <a:stretch/>
+        </p:blipFill>
+        <p:spPr bwMode="auto">
+          <a:xfrm>
+            <a:off x="1731258" y="1123527"/>
+            <a:ext cx="8729478" cy="4604800"/>
+          </a:xfrm>
+          <a:prstGeom prst="rect">
+            <a:avLst/>
+          </a:prstGeom>
+          <a:noFill/>
+          <a:extLst>
+            <a:ext uri="{909E8E84-426E-40DD-AFC4-6F175D3DCCD1}">
+              <a14:hiddenFill xmlns:a14="http://schemas.microsoft.com/office/drawing/2010/main">
+                <a:solidFill>
+                  <a:srgbClr val="FFFFFF"/>
+                </a:solidFill>
+              </a14:hiddenFill>
+            </a:ext>
+          </a:extLst>
+        </p:spPr>
+      </p:pic>
+    </p:spTree>
+    <p:extLst>
+      <p:ext uri="{BB962C8B-B14F-4D97-AF65-F5344CB8AC3E}">
+        <p14:creationId xmlns:p14="http://schemas.microsoft.com/office/powerpoint/2010/main" val="3610256965"/>
+      </p:ext>
+    </p:extLst>
+  </p:cSld>
+  <p:clrMapOvr>
+    <a:masterClrMapping/>
+  </p:clrMapOvr>
+</p:sld>
+</file>
+
+<file path=ppt/slides/slide13.xml><?xml version="1.0" encoding="utf-8"?>
+<p:sld xmlns:a="http://schemas.openxmlformats.org/drawingml/2006/main" xmlns:r="http://schemas.openxmlformats.org/officeDocument/2006/relationships" xmlns:p="http://schemas.openxmlformats.org/presentationml/2006/main">
+  <p:cSld>
+    <p:spTree>
+      <p:nvGrpSpPr>
+        <p:cNvPr id="1" name=""/>
+        <p:cNvGrpSpPr/>
+        <p:nvPr/>
+      </p:nvGrpSpPr>
+      <p:grpSpPr>
+        <a:xfrm>
+          <a:off x="0" y="0"/>
+          <a:ext cx="0" cy="0"/>
+          <a:chOff x="0" y="0"/>
+          <a:chExt cx="0" cy="0"/>
+        </a:xfrm>
+      </p:grpSpPr>
+      <p:pic>
+        <p:nvPicPr>
+          <p:cNvPr id="2" name="Picture 2" descr="http://itrevolution.com/wp-content/uploads/2012/08/third-way-400x224.png"/>
+          <p:cNvPicPr>
+            <a:picLocks noChangeAspect="1" noChangeArrowheads="1"/>
+          </p:cNvPicPr>
+          <p:nvPr/>
+        </p:nvPicPr>
+        <p:blipFill rotWithShape="1">
+          <a:blip r:embed="rId2">
+            <a:extLst>
+              <a:ext uri="{28A0092B-C50C-407E-A947-70E740481C1C}">
+                <a14:useLocalDpi xmlns:a14="http://schemas.microsoft.com/office/drawing/2010/main" val="0"/>
+              </a:ext>
+            </a:extLst>
+          </a:blip>
+          <a:srcRect/>
+          <a:stretch/>
+        </p:blipFill>
+        <p:spPr bwMode="auto">
+          <a:xfrm>
+            <a:off x="1984569" y="1123527"/>
+            <a:ext cx="8222857" cy="4604800"/>
+          </a:xfrm>
+          <a:prstGeom prst="rect">
+            <a:avLst/>
+          </a:prstGeom>
+          <a:noFill/>
+          <a:extLst>
+            <a:ext uri="{909E8E84-426E-40DD-AFC4-6F175D3DCCD1}">
+              <a14:hiddenFill xmlns:a14="http://schemas.microsoft.com/office/drawing/2010/main">
+                <a:solidFill>
+                  <a:srgbClr val="FFFFFF"/>
+                </a:solidFill>
+              </a14:hiddenFill>
+            </a:ext>
+          </a:extLst>
+        </p:spPr>
+      </p:pic>
+    </p:spTree>
+    <p:extLst>
+      <p:ext uri="{BB962C8B-B14F-4D97-AF65-F5344CB8AC3E}">
+        <p14:creationId xmlns:p14="http://schemas.microsoft.com/office/powerpoint/2010/main" val="1324868577"/>
+      </p:ext>
+    </p:extLst>
+  </p:cSld>
+  <p:clrMapOvr>
+    <a:masterClrMapping/>
+  </p:clrMapOvr>
+</p:sld>
+</file>
+
+<file path=ppt/slides/slide14.xml><?xml version="1.0" encoding="utf-8"?>
+<p:sld xmlns:a="http://schemas.openxmlformats.org/drawingml/2006/main" xmlns:r="http://schemas.openxmlformats.org/officeDocument/2006/relationships" xmlns:p="http://schemas.openxmlformats.org/presentationml/2006/main">
+  <p:cSld>
+    <p:spTree>
+      <p:nvGrpSpPr>
+        <p:cNvPr id="1" name=""/>
+        <p:cNvGrpSpPr/>
+        <p:nvPr/>
+      </p:nvGrpSpPr>
+      <p:grpSpPr>
+        <a:xfrm>
+          <a:off x="0" y="0"/>
+          <a:ext cx="0" cy="0"/>
+          <a:chOff x="0" y="0"/>
+          <a:chExt cx="0" cy="0"/>
+        </a:xfrm>
+      </p:grpSpPr>
       <p:pic>
         <p:nvPicPr>
           <p:cNvPr id="2" name="Picture 1"/>
@@ -3047,7 +3826,7 @@
         </p:blipFill>
         <p:spPr>
           <a:xfrm>
-            <a:off x="2667000" y="0"/>
+            <a:off x="2662175" y="6750"/>
             <a:ext cx="6858000" cy="6858000"/>
           </a:xfrm>
           <a:prstGeom prst="rect">
@@ -3071,7 +3850,7 @@
         </p:blipFill>
         <p:spPr>
           <a:xfrm>
-            <a:off x="2657350" y="13500"/>
+            <a:off x="2662175" y="6750"/>
             <a:ext cx="6858000" cy="6858000"/>
           </a:xfrm>
           <a:prstGeom prst="rect">
@@ -3095,7 +3874,7 @@
         </p:blipFill>
         <p:spPr>
           <a:xfrm>
-            <a:off x="2921000" y="254000"/>
+            <a:off x="2916175" y="260750"/>
             <a:ext cx="6350000" cy="6350000"/>
           </a:xfrm>
           <a:prstGeom prst="rect">
@@ -3119,7 +3898,7 @@
         </p:blipFill>
         <p:spPr>
           <a:xfrm>
-            <a:off x="2911350" y="267502"/>
+            <a:off x="2916175" y="260750"/>
             <a:ext cx="6350000" cy="6350000"/>
           </a:xfrm>
           <a:prstGeom prst="rect">
@@ -3143,7 +3922,7 @@
         </p:blipFill>
         <p:spPr>
           <a:xfrm>
-            <a:off x="2922926" y="244351"/>
+            <a:off x="2916175" y="260750"/>
             <a:ext cx="6350000" cy="6350000"/>
           </a:xfrm>
           <a:prstGeom prst="rect">
@@ -3167,7 +3946,7 @@
         </p:blipFill>
         <p:spPr>
           <a:xfrm>
-            <a:off x="2921000" y="219274"/>
+            <a:off x="2916175" y="260750"/>
             <a:ext cx="6350000" cy="6350000"/>
           </a:xfrm>
           <a:prstGeom prst="rect">
@@ -3443,6 +4222,408 @@
 </p:sld>
 </file>
 
+<file path=ppt/slides/slide15.xml><?xml version="1.0" encoding="utf-8"?>
+<p:sld xmlns:a="http://schemas.openxmlformats.org/drawingml/2006/main" xmlns:r="http://schemas.openxmlformats.org/officeDocument/2006/relationships" xmlns:p="http://schemas.openxmlformats.org/presentationml/2006/main">
+  <p:cSld>
+    <p:spTree>
+      <p:nvGrpSpPr>
+        <p:cNvPr id="1" name=""/>
+        <p:cNvGrpSpPr/>
+        <p:nvPr/>
+      </p:nvGrpSpPr>
+      <p:grpSpPr>
+        <a:xfrm>
+          <a:off x="0" y="0"/>
+          <a:ext cx="0" cy="0"/>
+          <a:chOff x="0" y="0"/>
+          <a:chExt cx="0" cy="0"/>
+        </a:xfrm>
+      </p:grpSpPr>
+      <p:sp>
+        <p:nvSpPr>
+          <p:cNvPr id="4" name="Title 3"/>
+          <p:cNvSpPr>
+            <a:spLocks noGrp="1"/>
+          </p:cNvSpPr>
+          <p:nvPr>
+            <p:ph type="ctrTitle"/>
+          </p:nvPr>
+        </p:nvSpPr>
+        <p:spPr/>
+        <p:txBody>
+          <a:bodyPr/>
+          <a:lstStyle/>
+          <a:p>
+            <a:r>
+              <a:rPr lang="en-US" dirty="0"/>
+              <a:t>1.3 – Challenges</a:t>
+            </a:r>
+          </a:p>
+        </p:txBody>
+      </p:sp>
+    </p:spTree>
+    <p:extLst>
+      <p:ext uri="{BB962C8B-B14F-4D97-AF65-F5344CB8AC3E}">
+        <p14:creationId xmlns:p14="http://schemas.microsoft.com/office/powerpoint/2010/main" val="1941287894"/>
+      </p:ext>
+    </p:extLst>
+  </p:cSld>
+  <p:clrMapOvr>
+    <a:masterClrMapping/>
+  </p:clrMapOvr>
+</p:sld>
+</file>
+
+<file path=ppt/slides/slide16.xml><?xml version="1.0" encoding="utf-8"?>
+<p:sld xmlns:a="http://schemas.openxmlformats.org/drawingml/2006/main" xmlns:r="http://schemas.openxmlformats.org/officeDocument/2006/relationships" xmlns:p="http://schemas.openxmlformats.org/presentationml/2006/main">
+  <p:cSld>
+    <p:spTree>
+      <p:nvGrpSpPr>
+        <p:cNvPr id="1" name=""/>
+        <p:cNvGrpSpPr/>
+        <p:nvPr/>
+      </p:nvGrpSpPr>
+      <p:grpSpPr>
+        <a:xfrm>
+          <a:off x="0" y="0"/>
+          <a:ext cx="0" cy="0"/>
+          <a:chOff x="0" y="0"/>
+          <a:chExt cx="0" cy="0"/>
+        </a:xfrm>
+      </p:grpSpPr>
+      <p:sp>
+        <p:nvSpPr>
+          <p:cNvPr id="2" name="Title 1"/>
+          <p:cNvSpPr>
+            <a:spLocks noGrp="1"/>
+          </p:cNvSpPr>
+          <p:nvPr>
+            <p:ph type="title"/>
+          </p:nvPr>
+        </p:nvSpPr>
+        <p:spPr/>
+        <p:txBody>
+          <a:bodyPr/>
+          <a:lstStyle/>
+          <a:p>
+            <a:r>
+              <a:rPr lang="en-US" dirty="0"/>
+              <a:t>Why are databases different?</a:t>
+            </a:r>
+          </a:p>
+        </p:txBody>
+      </p:sp>
+      <p:sp>
+        <p:nvSpPr>
+          <p:cNvPr id="3" name="Content Placeholder 2"/>
+          <p:cNvSpPr>
+            <a:spLocks noGrp="1"/>
+          </p:cNvSpPr>
+          <p:nvPr>
+            <p:ph idx="1"/>
+          </p:nvPr>
+        </p:nvSpPr>
+        <p:spPr/>
+        <p:txBody>
+          <a:bodyPr/>
+          <a:lstStyle/>
+          <a:p>
+            <a:r>
+              <a:rPr lang="en-US" dirty="0"/>
+              <a:t>“It Depends”</a:t>
+            </a:r>
+          </a:p>
+          <a:p>
+            <a:r>
+              <a:rPr lang="en-US" dirty="0"/>
+              <a:t>Some code is (almost) the same (views, stored procedures, functions)</a:t>
+            </a:r>
+          </a:p>
+          <a:p>
+            <a:r>
+              <a:rPr lang="en-US" dirty="0"/>
+              <a:t>Some code isn’t (tables, indexes, security)</a:t>
+            </a:r>
+          </a:p>
+          <a:p>
+            <a:pPr lvl="1"/>
+            <a:r>
+              <a:rPr lang="en-US" dirty="0"/>
+              <a:t>These structures maintain state</a:t>
+            </a:r>
+          </a:p>
+          <a:p>
+            <a:pPr lvl="1"/>
+            <a:r>
+              <a:rPr lang="en-US" dirty="0"/>
+              <a:t>They can be cumbersome to change</a:t>
+            </a:r>
+          </a:p>
+          <a:p>
+            <a:pPr lvl="1"/>
+            <a:r>
+              <a:rPr lang="en-US" dirty="0"/>
+              <a:t>Versioning might not work</a:t>
+            </a:r>
+          </a:p>
+          <a:p>
+            <a:endParaRPr lang="en-US" dirty="0"/>
+          </a:p>
+        </p:txBody>
+      </p:sp>
+    </p:spTree>
+    <p:extLst>
+      <p:ext uri="{BB962C8B-B14F-4D97-AF65-F5344CB8AC3E}">
+        <p14:creationId xmlns:p14="http://schemas.microsoft.com/office/powerpoint/2010/main" val="656809806"/>
+      </p:ext>
+    </p:extLst>
+  </p:cSld>
+  <p:clrMapOvr>
+    <a:masterClrMapping/>
+  </p:clrMapOvr>
+</p:sld>
+</file>
+
+<file path=ppt/slides/slide17.xml><?xml version="1.0" encoding="utf-8"?>
+<p:sld xmlns:a="http://schemas.openxmlformats.org/drawingml/2006/main" xmlns:r="http://schemas.openxmlformats.org/officeDocument/2006/relationships" xmlns:p="http://schemas.openxmlformats.org/presentationml/2006/main">
+  <p:cSld>
+    <p:spTree>
+      <p:nvGrpSpPr>
+        <p:cNvPr id="1" name=""/>
+        <p:cNvGrpSpPr/>
+        <p:nvPr/>
+      </p:nvGrpSpPr>
+      <p:grpSpPr>
+        <a:xfrm>
+          <a:off x="0" y="0"/>
+          <a:ext cx="0" cy="0"/>
+          <a:chOff x="0" y="0"/>
+          <a:chExt cx="0" cy="0"/>
+        </a:xfrm>
+      </p:grpSpPr>
+      <p:sp>
+        <p:nvSpPr>
+          <p:cNvPr id="4" name="Title 3"/>
+          <p:cNvSpPr>
+            <a:spLocks noGrp="1"/>
+          </p:cNvSpPr>
+          <p:nvPr>
+            <p:ph type="ctrTitle"/>
+          </p:nvPr>
+        </p:nvSpPr>
+        <p:spPr/>
+        <p:txBody>
+          <a:bodyPr/>
+          <a:lstStyle/>
+          <a:p>
+            <a:r>
+              <a:rPr lang="en-US" dirty="0"/>
+              <a:t>1.4 – Non-Technical Challenges</a:t>
+            </a:r>
+          </a:p>
+        </p:txBody>
+      </p:sp>
+    </p:spTree>
+    <p:extLst>
+      <p:ext uri="{BB962C8B-B14F-4D97-AF65-F5344CB8AC3E}">
+        <p14:creationId xmlns:p14="http://schemas.microsoft.com/office/powerpoint/2010/main" val="2061490233"/>
+      </p:ext>
+    </p:extLst>
+  </p:cSld>
+  <p:clrMapOvr>
+    <a:masterClrMapping/>
+  </p:clrMapOvr>
+</p:sld>
+</file>
+
+<file path=ppt/slides/slide18.xml><?xml version="1.0" encoding="utf-8"?>
+<p:sld xmlns:a="http://schemas.openxmlformats.org/drawingml/2006/main" xmlns:r="http://schemas.openxmlformats.org/officeDocument/2006/relationships" xmlns:p="http://schemas.openxmlformats.org/presentationml/2006/main">
+  <p:cSld>
+    <p:spTree>
+      <p:nvGrpSpPr>
+        <p:cNvPr id="1" name=""/>
+        <p:cNvGrpSpPr/>
+        <p:nvPr/>
+      </p:nvGrpSpPr>
+      <p:grpSpPr>
+        <a:xfrm>
+          <a:off x="0" y="0"/>
+          <a:ext cx="0" cy="0"/>
+          <a:chOff x="0" y="0"/>
+          <a:chExt cx="0" cy="0"/>
+        </a:xfrm>
+      </p:grpSpPr>
+      <p:sp>
+        <p:nvSpPr>
+          <p:cNvPr id="2" name="Title 1"/>
+          <p:cNvSpPr>
+            <a:spLocks noGrp="1"/>
+          </p:cNvSpPr>
+          <p:nvPr>
+            <p:ph type="title"/>
+          </p:nvPr>
+        </p:nvSpPr>
+        <p:spPr/>
+        <p:txBody>
+          <a:bodyPr/>
+          <a:lstStyle/>
+          <a:p>
+            <a:r>
+              <a:rPr lang="en-US" dirty="0"/>
+              <a:t>Non-Technical Challenges</a:t>
+            </a:r>
+          </a:p>
+        </p:txBody>
+      </p:sp>
+      <p:sp>
+        <p:nvSpPr>
+          <p:cNvPr id="3" name="Content Placeholder 2"/>
+          <p:cNvSpPr>
+            <a:spLocks noGrp="1"/>
+          </p:cNvSpPr>
+          <p:nvPr>
+            <p:ph idx="1"/>
+          </p:nvPr>
+        </p:nvSpPr>
+        <p:spPr/>
+        <p:txBody>
+          <a:bodyPr/>
+          <a:lstStyle/>
+          <a:p>
+            <a:r>
+              <a:rPr lang="en-US" dirty="0"/>
+              <a:t>Different staff responsibilities</a:t>
+            </a:r>
+          </a:p>
+          <a:p>
+            <a:pPr lvl="1"/>
+            <a:r>
+              <a:rPr lang="en-US" dirty="0"/>
+              <a:t>Change and improve v stability and performance</a:t>
+            </a:r>
+          </a:p>
+          <a:p>
+            <a:pPr lvl="1"/>
+            <a:r>
+              <a:rPr lang="en-US" dirty="0"/>
+              <a:t>Liability for issues</a:t>
+            </a:r>
+          </a:p>
+          <a:p>
+            <a:r>
+              <a:rPr lang="en-US" dirty="0"/>
+              <a:t>Staff Knowledge</a:t>
+            </a:r>
+          </a:p>
+          <a:p>
+            <a:pPr lvl="1"/>
+            <a:r>
+              <a:rPr lang="en-US" dirty="0"/>
+              <a:t>Fundamental nature of code management and deployment</a:t>
+            </a:r>
+          </a:p>
+          <a:p>
+            <a:pPr lvl="1"/>
+            <a:r>
+              <a:rPr lang="en-US" dirty="0"/>
+              <a:t>Habits for working with systems</a:t>
+            </a:r>
+          </a:p>
+          <a:p>
+            <a:r>
+              <a:rPr lang="en-US" dirty="0"/>
+              <a:t>Data Challenges</a:t>
+            </a:r>
+          </a:p>
+          <a:p>
+            <a:pPr lvl="1"/>
+            <a:r>
+              <a:rPr lang="en-US" dirty="0"/>
+              <a:t>Data migration between environments</a:t>
+            </a:r>
+          </a:p>
+          <a:p>
+            <a:pPr lvl="1"/>
+            <a:r>
+              <a:rPr lang="en-US" dirty="0"/>
+              <a:t>Data changes between environments</a:t>
+            </a:r>
+          </a:p>
+          <a:p>
+            <a:pPr lvl="1"/>
+            <a:r>
+              <a:rPr lang="en-US"/>
+              <a:t>Drift</a:t>
+            </a:r>
+            <a:endParaRPr lang="en-US" dirty="0"/>
+          </a:p>
+        </p:txBody>
+      </p:sp>
+    </p:spTree>
+    <p:extLst>
+      <p:ext uri="{BB962C8B-B14F-4D97-AF65-F5344CB8AC3E}">
+        <p14:creationId xmlns:p14="http://schemas.microsoft.com/office/powerpoint/2010/main" val="388552968"/>
+      </p:ext>
+    </p:extLst>
+  </p:cSld>
+  <p:clrMapOvr>
+    <a:masterClrMapping/>
+  </p:clrMapOvr>
+</p:sld>
+</file>
+
+<file path=ppt/slides/slide19.xml><?xml version="1.0" encoding="utf-8"?>
+<p:sld xmlns:a="http://schemas.openxmlformats.org/drawingml/2006/main" xmlns:r="http://schemas.openxmlformats.org/officeDocument/2006/relationships" xmlns:p="http://schemas.openxmlformats.org/presentationml/2006/main">
+  <p:cSld>
+    <p:spTree>
+      <p:nvGrpSpPr>
+        <p:cNvPr id="1" name=""/>
+        <p:cNvGrpSpPr/>
+        <p:nvPr/>
+      </p:nvGrpSpPr>
+      <p:grpSpPr>
+        <a:xfrm>
+          <a:off x="0" y="0"/>
+          <a:ext cx="0" cy="0"/>
+          <a:chOff x="0" y="0"/>
+          <a:chExt cx="0" cy="0"/>
+        </a:xfrm>
+      </p:grpSpPr>
+      <p:sp>
+        <p:nvSpPr>
+          <p:cNvPr id="4" name="Title 3"/>
+          <p:cNvSpPr>
+            <a:spLocks noGrp="1"/>
+          </p:cNvSpPr>
+          <p:nvPr>
+            <p:ph type="ctrTitle"/>
+          </p:nvPr>
+        </p:nvSpPr>
+        <p:spPr/>
+        <p:txBody>
+          <a:bodyPr/>
+          <a:lstStyle/>
+          <a:p>
+            <a:r>
+              <a:rPr lang="en-US" dirty="0"/>
+              <a:t>1.5 – ORMs?</a:t>
+            </a:r>
+          </a:p>
+        </p:txBody>
+      </p:sp>
+    </p:spTree>
+    <p:extLst>
+      <p:ext uri="{BB962C8B-B14F-4D97-AF65-F5344CB8AC3E}">
+        <p14:creationId xmlns:p14="http://schemas.microsoft.com/office/powerpoint/2010/main" val="628255903"/>
+      </p:ext>
+    </p:extLst>
+  </p:cSld>
+  <p:clrMapOvr>
+    <a:masterClrMapping/>
+  </p:clrMapOvr>
+</p:sld>
+</file>
+
 <file path=ppt/slides/slide2.xml><?xml version="1.0" encoding="utf-8"?>
 <p:sld xmlns:a="http://schemas.openxmlformats.org/drawingml/2006/main" xmlns:r="http://schemas.openxmlformats.org/officeDocument/2006/relationships" xmlns:p="http://schemas.openxmlformats.org/presentationml/2006/main">
   <p:cSld>
@@ -3462,86 +4643,22 @@
       </p:grpSpPr>
       <p:sp>
         <p:nvSpPr>
-          <p:cNvPr id="2" name="Title 1"/>
-          <p:cNvSpPr>
-            <a:spLocks noGrp="1"/>
-          </p:cNvSpPr>
-          <p:nvPr>
-            <p:ph type="title"/>
-          </p:nvPr>
-        </p:nvSpPr>
-        <p:spPr/>
-        <p:txBody>
-          <a:bodyPr/>
-          <a:lstStyle/>
-          <a:p>
-            <a:r>
-              <a:rPr lang="en-US" dirty="0"/>
-              <a:t>Course Overview</a:t>
-            </a:r>
-          </a:p>
-        </p:txBody>
-      </p:sp>
-      <p:sp>
-        <p:nvSpPr>
-          <p:cNvPr id="3" name="Content Placeholder 2"/>
-          <p:cNvSpPr>
-            <a:spLocks noGrp="1"/>
-          </p:cNvSpPr>
-          <p:nvPr>
-            <p:ph idx="1"/>
-          </p:nvPr>
-        </p:nvSpPr>
-        <p:spPr/>
-        <p:txBody>
-          <a:bodyPr/>
-          <a:lstStyle/>
-          <a:p>
-            <a:r>
-              <a:rPr lang="en-US" dirty="0"/>
-              <a:t>In this course, you will learn how to:</a:t>
-            </a:r>
-          </a:p>
-          <a:p>
-            <a:pPr lvl="1"/>
-            <a:r>
-              <a:rPr lang="en-US" dirty="0"/>
-              <a:t>Define DevOps</a:t>
-            </a:r>
-          </a:p>
-          <a:p>
-            <a:pPr lvl="1"/>
-            <a:r>
-              <a:rPr lang="en-US" dirty="0"/>
-              <a:t>Identify the challenges of database DevOps</a:t>
-            </a:r>
-          </a:p>
-          <a:p>
-            <a:pPr lvl="1"/>
-            <a:r>
-              <a:rPr lang="en-US" dirty="0"/>
-              <a:t>Include your database code alongside other application code in source control</a:t>
-            </a:r>
-          </a:p>
-          <a:p>
-            <a:pPr lvl="1"/>
-            <a:r>
-              <a:rPr lang="en-US" dirty="0"/>
-              <a:t>Setup a Continuous Integration (CI) platform for your database code.</a:t>
-            </a:r>
-          </a:p>
-          <a:p>
-            <a:pPr lvl="1"/>
-            <a:r>
-              <a:rPr lang="en-US" dirty="0"/>
-              <a:t>Write and include automated unit tests for your database code.</a:t>
-            </a:r>
-          </a:p>
-          <a:p>
-            <a:pPr lvl="1"/>
-            <a:r>
-              <a:rPr lang="en-US" dirty="0"/>
-              <a:t>Develop an automated release process that deploys database changes</a:t>
+          <p:cNvPr id="4" name="Title 3"/>
+          <p:cNvSpPr>
+            <a:spLocks noGrp="1"/>
+          </p:cNvSpPr>
+          <p:nvPr>
+            <p:ph type="ctrTitle"/>
+          </p:nvPr>
+        </p:nvSpPr>
+        <p:spPr/>
+        <p:txBody>
+          <a:bodyPr/>
+          <a:lstStyle/>
+          <a:p>
+            <a:r>
+              <a:rPr lang="en-US" dirty="0"/>
+              <a:t>1.1 - Overview</a:t>
             </a:r>
           </a:p>
         </p:txBody>
@@ -3549,7 +4666,804 @@
     </p:spTree>
     <p:extLst>
       <p:ext uri="{BB962C8B-B14F-4D97-AF65-F5344CB8AC3E}">
-        <p14:creationId xmlns:p14="http://schemas.microsoft.com/office/powerpoint/2010/main" val="131535962"/>
+        <p14:creationId xmlns:p14="http://schemas.microsoft.com/office/powerpoint/2010/main" val="4072576748"/>
+      </p:ext>
+    </p:extLst>
+  </p:cSld>
+  <p:clrMapOvr>
+    <a:masterClrMapping/>
+  </p:clrMapOvr>
+</p:sld>
+</file>
+
+<file path=ppt/slides/slide20.xml><?xml version="1.0" encoding="utf-8"?>
+<p:sld xmlns:a="http://schemas.openxmlformats.org/drawingml/2006/main" xmlns:r="http://schemas.openxmlformats.org/officeDocument/2006/relationships" xmlns:p="http://schemas.openxmlformats.org/presentationml/2006/main">
+  <p:cSld>
+    <p:spTree>
+      <p:nvGrpSpPr>
+        <p:cNvPr id="1" name=""/>
+        <p:cNvGrpSpPr/>
+        <p:nvPr/>
+      </p:nvGrpSpPr>
+      <p:grpSpPr>
+        <a:xfrm>
+          <a:off x="0" y="0"/>
+          <a:ext cx="0" cy="0"/>
+          <a:chOff x="0" y="0"/>
+          <a:chExt cx="0" cy="0"/>
+        </a:xfrm>
+      </p:grpSpPr>
+      <p:sp>
+        <p:nvSpPr>
+          <p:cNvPr id="4" name="Title 3"/>
+          <p:cNvSpPr>
+            <a:spLocks noGrp="1"/>
+          </p:cNvSpPr>
+          <p:nvPr>
+            <p:ph type="ctrTitle"/>
+          </p:nvPr>
+        </p:nvSpPr>
+        <p:spPr/>
+        <p:txBody>
+          <a:bodyPr/>
+          <a:lstStyle/>
+          <a:p>
+            <a:r>
+              <a:rPr lang="en-US" dirty="0"/>
+              <a:t>1.6 – State v Migrations</a:t>
+            </a:r>
+          </a:p>
+        </p:txBody>
+      </p:sp>
+    </p:spTree>
+    <p:extLst>
+      <p:ext uri="{BB962C8B-B14F-4D97-AF65-F5344CB8AC3E}">
+        <p14:creationId xmlns:p14="http://schemas.microsoft.com/office/powerpoint/2010/main" val="1758512999"/>
+      </p:ext>
+    </p:extLst>
+  </p:cSld>
+  <p:clrMapOvr>
+    <a:masterClrMapping/>
+  </p:clrMapOvr>
+</p:sld>
+</file>
+
+<file path=ppt/slides/slide21.xml><?xml version="1.0" encoding="utf-8"?>
+<p:sld xmlns:a="http://schemas.openxmlformats.org/drawingml/2006/main" xmlns:r="http://schemas.openxmlformats.org/officeDocument/2006/relationships" xmlns:p="http://schemas.openxmlformats.org/presentationml/2006/main">
+  <p:cSld>
+    <p:spTree>
+      <p:nvGrpSpPr>
+        <p:cNvPr id="1" name=""/>
+        <p:cNvGrpSpPr/>
+        <p:nvPr/>
+      </p:nvGrpSpPr>
+      <p:grpSpPr>
+        <a:xfrm>
+          <a:off x="0" y="0"/>
+          <a:ext cx="0" cy="0"/>
+          <a:chOff x="0" y="0"/>
+          <a:chExt cx="0" cy="0"/>
+        </a:xfrm>
+      </p:grpSpPr>
+      <p:sp>
+        <p:nvSpPr>
+          <p:cNvPr id="2" name="Title 1"/>
+          <p:cNvSpPr>
+            <a:spLocks noGrp="1"/>
+          </p:cNvSpPr>
+          <p:nvPr>
+            <p:ph type="title"/>
+          </p:nvPr>
+        </p:nvSpPr>
+        <p:spPr/>
+        <p:txBody>
+          <a:bodyPr/>
+          <a:lstStyle/>
+          <a:p>
+            <a:r>
+              <a:rPr lang="en-US" dirty="0"/>
+              <a:t>State Based Database Development</a:t>
+            </a:r>
+          </a:p>
+        </p:txBody>
+      </p:sp>
+      <p:sp>
+        <p:nvSpPr>
+          <p:cNvPr id="3" name="Content Placeholder 2"/>
+          <p:cNvSpPr>
+            <a:spLocks noGrp="1"/>
+          </p:cNvSpPr>
+          <p:nvPr>
+            <p:ph idx="1"/>
+          </p:nvPr>
+        </p:nvSpPr>
+        <p:spPr/>
+        <p:txBody>
+          <a:bodyPr/>
+          <a:lstStyle/>
+          <a:p>
+            <a:r>
+              <a:rPr lang="en-US" dirty="0"/>
+              <a:t>Capture the “state” of all code at a point in time (a snapshot)</a:t>
+            </a:r>
+          </a:p>
+          <a:p>
+            <a:r>
+              <a:rPr lang="en-US" dirty="0"/>
+              <a:t>Compare this state with another version of this state</a:t>
+            </a:r>
+          </a:p>
+          <a:p>
+            <a:pPr lvl="1"/>
+            <a:r>
+              <a:rPr lang="en-US" dirty="0"/>
+              <a:t>Can be database to database</a:t>
+            </a:r>
+          </a:p>
+          <a:p>
+            <a:pPr lvl="1"/>
+            <a:r>
+              <a:rPr lang="en-US" dirty="0"/>
+              <a:t>Can be VCS to database</a:t>
+            </a:r>
+          </a:p>
+          <a:p>
+            <a:r>
+              <a:rPr lang="en-US" dirty="0"/>
+              <a:t>Use the comparison to generate a script that will deploy changes from one version to the next.</a:t>
+            </a:r>
+          </a:p>
+        </p:txBody>
+      </p:sp>
+    </p:spTree>
+    <p:extLst>
+      <p:ext uri="{BB962C8B-B14F-4D97-AF65-F5344CB8AC3E}">
+        <p14:creationId xmlns:p14="http://schemas.microsoft.com/office/powerpoint/2010/main" val="3289911084"/>
+      </p:ext>
+    </p:extLst>
+  </p:cSld>
+  <p:clrMapOvr>
+    <a:masterClrMapping/>
+  </p:clrMapOvr>
+</p:sld>
+</file>
+
+<file path=ppt/slides/slide22.xml><?xml version="1.0" encoding="utf-8"?>
+<p:sld xmlns:a="http://schemas.openxmlformats.org/drawingml/2006/main" xmlns:r="http://schemas.openxmlformats.org/officeDocument/2006/relationships" xmlns:p="http://schemas.openxmlformats.org/presentationml/2006/main">
+  <p:cSld>
+    <p:spTree>
+      <p:nvGrpSpPr>
+        <p:cNvPr id="1" name=""/>
+        <p:cNvGrpSpPr/>
+        <p:nvPr/>
+      </p:nvGrpSpPr>
+      <p:grpSpPr>
+        <a:xfrm>
+          <a:off x="0" y="0"/>
+          <a:ext cx="0" cy="0"/>
+          <a:chOff x="0" y="0"/>
+          <a:chExt cx="0" cy="0"/>
+        </a:xfrm>
+      </p:grpSpPr>
+      <p:sp>
+        <p:nvSpPr>
+          <p:cNvPr id="2" name="Title 1"/>
+          <p:cNvSpPr>
+            <a:spLocks noGrp="1"/>
+          </p:cNvSpPr>
+          <p:nvPr>
+            <p:ph type="title"/>
+          </p:nvPr>
+        </p:nvSpPr>
+        <p:spPr/>
+        <p:txBody>
+          <a:bodyPr/>
+          <a:lstStyle/>
+          <a:p>
+            <a:r>
+              <a:rPr lang="en-US" dirty="0"/>
+              <a:t>State Based Database Development</a:t>
+            </a:r>
+          </a:p>
+        </p:txBody>
+      </p:sp>
+      <p:sp>
+        <p:nvSpPr>
+          <p:cNvPr id="3" name="Content Placeholder 2"/>
+          <p:cNvSpPr>
+            <a:spLocks noGrp="1"/>
+          </p:cNvSpPr>
+          <p:nvPr>
+            <p:ph idx="1"/>
+          </p:nvPr>
+        </p:nvSpPr>
+        <p:spPr/>
+        <p:txBody>
+          <a:bodyPr/>
+          <a:lstStyle/>
+          <a:p>
+            <a:r>
+              <a:rPr lang="en-US" dirty="0"/>
+              <a:t>Advantages</a:t>
+            </a:r>
+          </a:p>
+          <a:p>
+            <a:pPr lvl="1"/>
+            <a:r>
+              <a:rPr lang="en-US" dirty="0"/>
+              <a:t>Simple for developers, nothing to track</a:t>
+            </a:r>
+          </a:p>
+          <a:p>
+            <a:pPr lvl="1"/>
+            <a:r>
+              <a:rPr lang="en-US" dirty="0"/>
+              <a:t>Transient changes (those not needed) are not transferred</a:t>
+            </a:r>
+          </a:p>
+          <a:p>
+            <a:pPr lvl="1"/>
+            <a:r>
+              <a:rPr lang="en-US" dirty="0"/>
+              <a:t>Branching and merging is (relatively) easy</a:t>
+            </a:r>
+          </a:p>
+          <a:p>
+            <a:pPr lvl="1"/>
+            <a:r>
+              <a:rPr lang="en-US" dirty="0"/>
+              <a:t>Simplicity</a:t>
+            </a:r>
+          </a:p>
+          <a:p>
+            <a:r>
+              <a:rPr lang="en-US" dirty="0"/>
+              <a:t>Disadvantages</a:t>
+            </a:r>
+          </a:p>
+          <a:p>
+            <a:pPr lvl="1"/>
+            <a:r>
+              <a:rPr lang="en-US" dirty="0"/>
+              <a:t>Some changes cannot be captured with snapshot comparisons</a:t>
+            </a:r>
+          </a:p>
+          <a:p>
+            <a:pPr lvl="1"/>
+            <a:r>
+              <a:rPr lang="en-US" dirty="0"/>
+              <a:t>Upgrades of databases tend to require known starting/ending points.</a:t>
+            </a:r>
+          </a:p>
+          <a:p>
+            <a:pPr lvl="1"/>
+            <a:r>
+              <a:rPr lang="en-US" dirty="0"/>
+              <a:t>Multiple versions of databases are not easily upgraded</a:t>
+            </a:r>
+          </a:p>
+        </p:txBody>
+      </p:sp>
+    </p:spTree>
+    <p:extLst>
+      <p:ext uri="{BB962C8B-B14F-4D97-AF65-F5344CB8AC3E}">
+        <p14:creationId xmlns:p14="http://schemas.microsoft.com/office/powerpoint/2010/main" val="3301673044"/>
+      </p:ext>
+    </p:extLst>
+  </p:cSld>
+  <p:clrMapOvr>
+    <a:masterClrMapping/>
+  </p:clrMapOvr>
+</p:sld>
+</file>
+
+<file path=ppt/slides/slide23.xml><?xml version="1.0" encoding="utf-8"?>
+<p:sld xmlns:a="http://schemas.openxmlformats.org/drawingml/2006/main" xmlns:r="http://schemas.openxmlformats.org/officeDocument/2006/relationships" xmlns:p="http://schemas.openxmlformats.org/presentationml/2006/main">
+  <p:cSld>
+    <p:spTree>
+      <p:nvGrpSpPr>
+        <p:cNvPr id="1" name=""/>
+        <p:cNvGrpSpPr/>
+        <p:nvPr/>
+      </p:nvGrpSpPr>
+      <p:grpSpPr>
+        <a:xfrm>
+          <a:off x="0" y="0"/>
+          <a:ext cx="0" cy="0"/>
+          <a:chOff x="0" y="0"/>
+          <a:chExt cx="0" cy="0"/>
+        </a:xfrm>
+      </p:grpSpPr>
+      <p:pic>
+        <p:nvPicPr>
+          <p:cNvPr id="6" name="Content Placeholder 5"/>
+          <p:cNvPicPr>
+            <a:picLocks noGrp="1" noChangeAspect="1"/>
+          </p:cNvPicPr>
+          <p:nvPr>
+            <p:ph idx="1"/>
+          </p:nvPr>
+        </p:nvPicPr>
+        <p:blipFill>
+          <a:blip r:embed="rId2">
+            <a:extLst>
+              <a:ext uri="{28A0092B-C50C-407E-A947-70E740481C1C}">
+                <a14:useLocalDpi xmlns:a14="http://schemas.microsoft.com/office/drawing/2010/main" val="0"/>
+              </a:ext>
+            </a:extLst>
+          </a:blip>
+          <a:stretch>
+            <a:fillRect/>
+          </a:stretch>
+        </p:blipFill>
+        <p:spPr>
+          <a:xfrm>
+            <a:off x="309965" y="0"/>
+            <a:ext cx="11437749" cy="6806680"/>
+          </a:xfrm>
+        </p:spPr>
+      </p:pic>
+    </p:spTree>
+    <p:extLst>
+      <p:ext uri="{BB962C8B-B14F-4D97-AF65-F5344CB8AC3E}">
+        <p14:creationId xmlns:p14="http://schemas.microsoft.com/office/powerpoint/2010/main" val="4256454319"/>
+      </p:ext>
+    </p:extLst>
+  </p:cSld>
+  <p:clrMapOvr>
+    <a:masterClrMapping/>
+  </p:clrMapOvr>
+</p:sld>
+</file>
+
+<file path=ppt/slides/slide24.xml><?xml version="1.0" encoding="utf-8"?>
+<p:sld xmlns:a="http://schemas.openxmlformats.org/drawingml/2006/main" xmlns:r="http://schemas.openxmlformats.org/officeDocument/2006/relationships" xmlns:p="http://schemas.openxmlformats.org/presentationml/2006/main">
+  <p:cSld>
+    <p:spTree>
+      <p:nvGrpSpPr>
+        <p:cNvPr id="1" name=""/>
+        <p:cNvGrpSpPr/>
+        <p:nvPr/>
+      </p:nvGrpSpPr>
+      <p:grpSpPr>
+        <a:xfrm>
+          <a:off x="0" y="0"/>
+          <a:ext cx="0" cy="0"/>
+          <a:chOff x="0" y="0"/>
+          <a:chExt cx="0" cy="0"/>
+        </a:xfrm>
+      </p:grpSpPr>
+      <p:sp>
+        <p:nvSpPr>
+          <p:cNvPr id="2" name="Title 1"/>
+          <p:cNvSpPr>
+            <a:spLocks noGrp="1"/>
+          </p:cNvSpPr>
+          <p:nvPr>
+            <p:ph type="title"/>
+          </p:nvPr>
+        </p:nvSpPr>
+        <p:spPr/>
+        <p:txBody>
+          <a:bodyPr/>
+          <a:lstStyle/>
+          <a:p>
+            <a:r>
+              <a:rPr lang="en-US" dirty="0"/>
+              <a:t>Generated script for table rename</a:t>
+            </a:r>
+          </a:p>
+        </p:txBody>
+      </p:sp>
+      <p:pic>
+        <p:nvPicPr>
+          <p:cNvPr id="4" name="Content Placeholder 3"/>
+          <p:cNvPicPr>
+            <a:picLocks noGrp="1" noChangeAspect="1"/>
+          </p:cNvPicPr>
+          <p:nvPr>
+            <p:ph idx="1"/>
+          </p:nvPr>
+        </p:nvPicPr>
+        <p:blipFill>
+          <a:blip r:embed="rId2">
+            <a:extLst>
+              <a:ext uri="{28A0092B-C50C-407E-A947-70E740481C1C}">
+                <a14:useLocalDpi xmlns:a14="http://schemas.microsoft.com/office/drawing/2010/main" val="0"/>
+              </a:ext>
+            </a:extLst>
+          </a:blip>
+          <a:stretch>
+            <a:fillRect/>
+          </a:stretch>
+        </p:blipFill>
+        <p:spPr>
+          <a:xfrm>
+            <a:off x="2880864" y="1857870"/>
+            <a:ext cx="6430272" cy="4286848"/>
+          </a:xfrm>
+        </p:spPr>
+      </p:pic>
+    </p:spTree>
+    <p:extLst>
+      <p:ext uri="{BB962C8B-B14F-4D97-AF65-F5344CB8AC3E}">
+        <p14:creationId xmlns:p14="http://schemas.microsoft.com/office/powerpoint/2010/main" val="2534627903"/>
+      </p:ext>
+    </p:extLst>
+  </p:cSld>
+  <p:clrMapOvr>
+    <a:masterClrMapping/>
+  </p:clrMapOvr>
+</p:sld>
+</file>
+
+<file path=ppt/slides/slide25.xml><?xml version="1.0" encoding="utf-8"?>
+<p:sld xmlns:a="http://schemas.openxmlformats.org/drawingml/2006/main" xmlns:r="http://schemas.openxmlformats.org/officeDocument/2006/relationships" xmlns:p="http://schemas.openxmlformats.org/presentationml/2006/main">
+  <p:cSld>
+    <p:spTree>
+      <p:nvGrpSpPr>
+        <p:cNvPr id="1" name=""/>
+        <p:cNvGrpSpPr/>
+        <p:nvPr/>
+      </p:nvGrpSpPr>
+      <p:grpSpPr>
+        <a:xfrm>
+          <a:off x="0" y="0"/>
+          <a:ext cx="0" cy="0"/>
+          <a:chOff x="0" y="0"/>
+          <a:chExt cx="0" cy="0"/>
+        </a:xfrm>
+      </p:grpSpPr>
+      <p:sp>
+        <p:nvSpPr>
+          <p:cNvPr id="2" name="Title 1"/>
+          <p:cNvSpPr>
+            <a:spLocks noGrp="1"/>
+          </p:cNvSpPr>
+          <p:nvPr>
+            <p:ph type="title"/>
+          </p:nvPr>
+        </p:nvSpPr>
+        <p:spPr/>
+        <p:txBody>
+          <a:bodyPr/>
+          <a:lstStyle/>
+          <a:p>
+            <a:r>
+              <a:rPr lang="en-US" dirty="0"/>
+              <a:t>Migration Based Database Development</a:t>
+            </a:r>
+          </a:p>
+        </p:txBody>
+      </p:sp>
+      <p:sp>
+        <p:nvSpPr>
+          <p:cNvPr id="3" name="Content Placeholder 2"/>
+          <p:cNvSpPr>
+            <a:spLocks noGrp="1"/>
+          </p:cNvSpPr>
+          <p:nvPr>
+            <p:ph idx="1"/>
+          </p:nvPr>
+        </p:nvSpPr>
+        <p:spPr/>
+        <p:txBody>
+          <a:bodyPr/>
+          <a:lstStyle/>
+          <a:p>
+            <a:r>
+              <a:rPr lang="en-US" dirty="0"/>
+              <a:t>All changes made to a database are tracked as they are made.</a:t>
+            </a:r>
+          </a:p>
+          <a:p>
+            <a:r>
+              <a:rPr lang="en-US" dirty="0"/>
+              <a:t>Changes are ordered and executed in the same order on downstream environments</a:t>
+            </a:r>
+          </a:p>
+          <a:p>
+            <a:r>
+              <a:rPr lang="en-US" dirty="0"/>
+              <a:t>The actual code a developer executes is replayed in downstream environments.</a:t>
+            </a:r>
+          </a:p>
+        </p:txBody>
+      </p:sp>
+    </p:spTree>
+    <p:extLst>
+      <p:ext uri="{BB962C8B-B14F-4D97-AF65-F5344CB8AC3E}">
+        <p14:creationId xmlns:p14="http://schemas.microsoft.com/office/powerpoint/2010/main" val="2465777514"/>
+      </p:ext>
+    </p:extLst>
+  </p:cSld>
+  <p:clrMapOvr>
+    <a:masterClrMapping/>
+  </p:clrMapOvr>
+</p:sld>
+</file>
+
+<file path=ppt/slides/slide26.xml><?xml version="1.0" encoding="utf-8"?>
+<p:sld xmlns:a="http://schemas.openxmlformats.org/drawingml/2006/main" xmlns:r="http://schemas.openxmlformats.org/officeDocument/2006/relationships" xmlns:p="http://schemas.openxmlformats.org/presentationml/2006/main">
+  <p:cSld>
+    <p:spTree>
+      <p:nvGrpSpPr>
+        <p:cNvPr id="1" name=""/>
+        <p:cNvGrpSpPr/>
+        <p:nvPr/>
+      </p:nvGrpSpPr>
+      <p:grpSpPr>
+        <a:xfrm>
+          <a:off x="0" y="0"/>
+          <a:ext cx="0" cy="0"/>
+          <a:chOff x="0" y="0"/>
+          <a:chExt cx="0" cy="0"/>
+        </a:xfrm>
+      </p:grpSpPr>
+      <p:sp>
+        <p:nvSpPr>
+          <p:cNvPr id="2" name="Title 1"/>
+          <p:cNvSpPr>
+            <a:spLocks noGrp="1"/>
+          </p:cNvSpPr>
+          <p:nvPr>
+            <p:ph type="title"/>
+          </p:nvPr>
+        </p:nvSpPr>
+        <p:spPr/>
+        <p:txBody>
+          <a:bodyPr/>
+          <a:lstStyle/>
+          <a:p>
+            <a:r>
+              <a:rPr lang="en-US" dirty="0"/>
+              <a:t>Migration Based Database Development</a:t>
+            </a:r>
+          </a:p>
+        </p:txBody>
+      </p:sp>
+      <p:sp>
+        <p:nvSpPr>
+          <p:cNvPr id="3" name="Content Placeholder 2"/>
+          <p:cNvSpPr>
+            <a:spLocks noGrp="1"/>
+          </p:cNvSpPr>
+          <p:nvPr>
+            <p:ph idx="1"/>
+          </p:nvPr>
+        </p:nvSpPr>
+        <p:spPr/>
+        <p:txBody>
+          <a:bodyPr/>
+          <a:lstStyle/>
+          <a:p>
+            <a:r>
+              <a:rPr lang="en-US" dirty="0"/>
+              <a:t>Advantages</a:t>
+            </a:r>
+          </a:p>
+          <a:p>
+            <a:pPr lvl="1"/>
+            <a:r>
+              <a:rPr lang="en-US" dirty="0"/>
+              <a:t>The exact code is executed in all environments, ensuring repeatability and reliability.</a:t>
+            </a:r>
+          </a:p>
+          <a:p>
+            <a:pPr lvl="1"/>
+            <a:r>
+              <a:rPr lang="en-US" dirty="0"/>
+              <a:t>Any version of a database can be upgraded to any other version</a:t>
+            </a:r>
+          </a:p>
+          <a:p>
+            <a:r>
+              <a:rPr lang="en-US" dirty="0"/>
+              <a:t>Disadvantages</a:t>
+            </a:r>
+          </a:p>
+          <a:p>
+            <a:pPr lvl="1"/>
+            <a:r>
+              <a:rPr lang="en-US" dirty="0"/>
+              <a:t>Changes need to be tracked</a:t>
+            </a:r>
+          </a:p>
+          <a:p>
+            <a:pPr lvl="1"/>
+            <a:r>
+              <a:rPr lang="en-US" dirty="0"/>
+              <a:t>Ordering is important and merging branches of development can be complex</a:t>
+            </a:r>
+          </a:p>
+          <a:p>
+            <a:pPr lvl="1"/>
+            <a:r>
+              <a:rPr lang="en-US" dirty="0"/>
+              <a:t>Lots of scripts may need to be run, lengthening deployment</a:t>
+            </a:r>
+          </a:p>
+        </p:txBody>
+      </p:sp>
+    </p:spTree>
+    <p:extLst>
+      <p:ext uri="{BB962C8B-B14F-4D97-AF65-F5344CB8AC3E}">
+        <p14:creationId xmlns:p14="http://schemas.microsoft.com/office/powerpoint/2010/main" val="550214098"/>
+      </p:ext>
+    </p:extLst>
+  </p:cSld>
+  <p:clrMapOvr>
+    <a:masterClrMapping/>
+  </p:clrMapOvr>
+</p:sld>
+</file>
+
+<file path=ppt/slides/slide27.xml><?xml version="1.0" encoding="utf-8"?>
+<p:sld xmlns:a="http://schemas.openxmlformats.org/drawingml/2006/main" xmlns:r="http://schemas.openxmlformats.org/officeDocument/2006/relationships" xmlns:p="http://schemas.openxmlformats.org/presentationml/2006/main">
+  <p:cSld>
+    <p:spTree>
+      <p:nvGrpSpPr>
+        <p:cNvPr id="1" name=""/>
+        <p:cNvGrpSpPr/>
+        <p:nvPr/>
+      </p:nvGrpSpPr>
+      <p:grpSpPr>
+        <a:xfrm>
+          <a:off x="0" y="0"/>
+          <a:ext cx="0" cy="0"/>
+          <a:chOff x="0" y="0"/>
+          <a:chExt cx="0" cy="0"/>
+        </a:xfrm>
+      </p:grpSpPr>
+      <p:sp>
+        <p:nvSpPr>
+          <p:cNvPr id="4" name="Title 3"/>
+          <p:cNvSpPr>
+            <a:spLocks noGrp="1"/>
+          </p:cNvSpPr>
+          <p:nvPr>
+            <p:ph type="ctrTitle"/>
+          </p:nvPr>
+        </p:nvSpPr>
+        <p:spPr/>
+        <p:txBody>
+          <a:bodyPr/>
+          <a:lstStyle/>
+          <a:p>
+            <a:r>
+              <a:rPr lang="en-US" dirty="0"/>
+              <a:t>1.7 – State v Migrations</a:t>
+            </a:r>
+          </a:p>
+        </p:txBody>
+      </p:sp>
+    </p:spTree>
+    <p:extLst>
+      <p:ext uri="{BB962C8B-B14F-4D97-AF65-F5344CB8AC3E}">
+        <p14:creationId xmlns:p14="http://schemas.microsoft.com/office/powerpoint/2010/main" val="382865639"/>
+      </p:ext>
+    </p:extLst>
+  </p:cSld>
+  <p:clrMapOvr>
+    <a:masterClrMapping/>
+  </p:clrMapOvr>
+</p:sld>
+</file>
+
+<file path=ppt/slides/slide28.xml><?xml version="1.0" encoding="utf-8"?>
+<p:sld xmlns:a="http://schemas.openxmlformats.org/drawingml/2006/main" xmlns:r="http://schemas.openxmlformats.org/officeDocument/2006/relationships" xmlns:p="http://schemas.openxmlformats.org/presentationml/2006/main">
+  <p:cSld>
+    <p:spTree>
+      <p:nvGrpSpPr>
+        <p:cNvPr id="1" name=""/>
+        <p:cNvGrpSpPr/>
+        <p:nvPr/>
+      </p:nvGrpSpPr>
+      <p:grpSpPr>
+        <a:xfrm>
+          <a:off x="0" y="0"/>
+          <a:ext cx="0" cy="0"/>
+          <a:chOff x="0" y="0"/>
+          <a:chExt cx="0" cy="0"/>
+        </a:xfrm>
+      </p:grpSpPr>
+      <p:sp>
+        <p:nvSpPr>
+          <p:cNvPr id="2" name="Title 1"/>
+          <p:cNvSpPr>
+            <a:spLocks noGrp="1"/>
+          </p:cNvSpPr>
+          <p:nvPr>
+            <p:ph type="title"/>
+          </p:nvPr>
+        </p:nvSpPr>
+        <p:spPr/>
+        <p:txBody>
+          <a:bodyPr/>
+          <a:lstStyle/>
+          <a:p>
+            <a:r>
+              <a:rPr lang="en-US" dirty="0"/>
+              <a:t>Building Better Collaboration</a:t>
+            </a:r>
+          </a:p>
+        </p:txBody>
+      </p:sp>
+      <p:sp>
+        <p:nvSpPr>
+          <p:cNvPr id="3" name="Content Placeholder 2"/>
+          <p:cNvSpPr>
+            <a:spLocks noGrp="1"/>
+          </p:cNvSpPr>
+          <p:nvPr>
+            <p:ph idx="1"/>
+          </p:nvPr>
+        </p:nvSpPr>
+        <p:spPr/>
+        <p:txBody>
+          <a:bodyPr/>
+          <a:lstStyle/>
+          <a:p>
+            <a:endParaRPr lang="en-US" dirty="0"/>
+          </a:p>
+        </p:txBody>
+      </p:sp>
+    </p:spTree>
+    <p:extLst>
+      <p:ext uri="{BB962C8B-B14F-4D97-AF65-F5344CB8AC3E}">
+        <p14:creationId xmlns:p14="http://schemas.microsoft.com/office/powerpoint/2010/main" val="671771135"/>
+      </p:ext>
+    </p:extLst>
+  </p:cSld>
+  <p:clrMapOvr>
+    <a:masterClrMapping/>
+  </p:clrMapOvr>
+</p:sld>
+</file>
+
+<file path=ppt/slides/slide29.xml><?xml version="1.0" encoding="utf-8"?>
+<p:sld xmlns:a="http://schemas.openxmlformats.org/drawingml/2006/main" xmlns:r="http://schemas.openxmlformats.org/officeDocument/2006/relationships" xmlns:p="http://schemas.openxmlformats.org/presentationml/2006/main">
+  <p:cSld>
+    <p:spTree>
+      <p:nvGrpSpPr>
+        <p:cNvPr id="1" name=""/>
+        <p:cNvGrpSpPr/>
+        <p:nvPr/>
+      </p:nvGrpSpPr>
+      <p:grpSpPr>
+        <a:xfrm>
+          <a:off x="0" y="0"/>
+          <a:ext cx="0" cy="0"/>
+          <a:chOff x="0" y="0"/>
+          <a:chExt cx="0" cy="0"/>
+        </a:xfrm>
+      </p:grpSpPr>
+      <p:sp>
+        <p:nvSpPr>
+          <p:cNvPr id="4" name="Title 3"/>
+          <p:cNvSpPr>
+            <a:spLocks noGrp="1"/>
+          </p:cNvSpPr>
+          <p:nvPr>
+            <p:ph type="ctrTitle"/>
+          </p:nvPr>
+        </p:nvSpPr>
+        <p:spPr/>
+        <p:txBody>
+          <a:bodyPr/>
+          <a:lstStyle/>
+          <a:p>
+            <a:r>
+              <a:rPr lang="en-US" dirty="0"/>
+              <a:t>1.8 – Lab Setup</a:t>
+            </a:r>
+          </a:p>
+        </p:txBody>
+      </p:sp>
+    </p:spTree>
+    <p:extLst>
+      <p:ext uri="{BB962C8B-B14F-4D97-AF65-F5344CB8AC3E}">
+        <p14:creationId xmlns:p14="http://schemas.microsoft.com/office/powerpoint/2010/main" val="2388857817"/>
       </p:ext>
     </p:extLst>
   </p:cSld>
@@ -3593,7 +5507,7 @@
           <a:p>
             <a:r>
               <a:rPr lang="en-US" dirty="0"/>
-              <a:t>Course Structure</a:t>
+              <a:t>Title slide?</a:t>
             </a:r>
           </a:p>
         </p:txBody>
@@ -3613,43 +5527,301 @@
           <a:bodyPr/>
           <a:lstStyle/>
           <a:p>
-            <a:r>
-              <a:rPr lang="en-US" dirty="0"/>
-              <a:t>This course consists of</a:t>
-            </a:r>
-          </a:p>
-          <a:p>
-            <a:pPr lvl="1"/>
-            <a:r>
-              <a:rPr lang="en-US" dirty="0"/>
-              <a:t>Lectures and videos of course material</a:t>
-            </a:r>
-          </a:p>
-          <a:p>
-            <a:pPr lvl="1"/>
-            <a:r>
-              <a:rPr lang="en-US" dirty="0"/>
-              <a:t>Assessment questions after each section</a:t>
-            </a:r>
-          </a:p>
-          <a:p>
-            <a:pPr lvl="1"/>
-            <a:r>
-              <a:rPr lang="en-US" dirty="0"/>
-              <a:t>Hands on labs for you to </a:t>
-            </a:r>
-            <a:r>
-              <a:rPr lang="en-US"/>
-              <a:t>practice skills</a:t>
-            </a:r>
-            <a:endParaRPr lang="en-US" dirty="0"/>
+            <a:endParaRPr lang="en-US"/>
           </a:p>
         </p:txBody>
       </p:sp>
     </p:spTree>
     <p:extLst>
       <p:ext uri="{BB962C8B-B14F-4D97-AF65-F5344CB8AC3E}">
-        <p14:creationId xmlns:p14="http://schemas.microsoft.com/office/powerpoint/2010/main" val="3810271598"/>
+        <p14:creationId xmlns:p14="http://schemas.microsoft.com/office/powerpoint/2010/main" val="2740925185"/>
+      </p:ext>
+    </p:extLst>
+  </p:cSld>
+  <p:clrMapOvr>
+    <a:masterClrMapping/>
+  </p:clrMapOvr>
+</p:sld>
+</file>
+
+<file path=ppt/slides/slide30.xml><?xml version="1.0" encoding="utf-8"?>
+<p:sld xmlns:a="http://schemas.openxmlformats.org/drawingml/2006/main" xmlns:r="http://schemas.openxmlformats.org/officeDocument/2006/relationships" xmlns:p="http://schemas.openxmlformats.org/presentationml/2006/main">
+  <p:cSld>
+    <p:spTree>
+      <p:nvGrpSpPr>
+        <p:cNvPr id="1" name=""/>
+        <p:cNvGrpSpPr/>
+        <p:nvPr/>
+      </p:nvGrpSpPr>
+      <p:grpSpPr>
+        <a:xfrm>
+          <a:off x="0" y="0"/>
+          <a:ext cx="0" cy="0"/>
+          <a:chOff x="0" y="0"/>
+          <a:chExt cx="0" cy="0"/>
+        </a:xfrm>
+      </p:grpSpPr>
+      <p:sp>
+        <p:nvSpPr>
+          <p:cNvPr id="2" name="Title 1"/>
+          <p:cNvSpPr>
+            <a:spLocks noGrp="1"/>
+          </p:cNvSpPr>
+          <p:nvPr>
+            <p:ph type="title"/>
+          </p:nvPr>
+        </p:nvSpPr>
+        <p:spPr/>
+        <p:txBody>
+          <a:bodyPr/>
+          <a:lstStyle/>
+          <a:p>
+            <a:r>
+              <a:rPr lang="en-US" dirty="0"/>
+              <a:t>Hands On Lab</a:t>
+            </a:r>
+          </a:p>
+        </p:txBody>
+      </p:sp>
+      <p:sp>
+        <p:nvSpPr>
+          <p:cNvPr id="3" name="Content Placeholder 2"/>
+          <p:cNvSpPr>
+            <a:spLocks noGrp="1"/>
+          </p:cNvSpPr>
+          <p:nvPr>
+            <p:ph idx="1"/>
+          </p:nvPr>
+        </p:nvSpPr>
+        <p:spPr/>
+        <p:txBody>
+          <a:bodyPr/>
+          <a:lstStyle/>
+          <a:p>
+            <a:r>
+              <a:rPr lang="en-US" dirty="0"/>
+              <a:t>The lab for this course will walk you through the setup of a series of databases where you will implement a CI process, and deploy changes to downstream environments.</a:t>
+            </a:r>
+          </a:p>
+          <a:p>
+            <a:r>
+              <a:rPr lang="en-US" dirty="0"/>
+              <a:t>We will use these environments:</a:t>
+            </a:r>
+          </a:p>
+          <a:p>
+            <a:pPr lvl="1"/>
+            <a:r>
+              <a:rPr lang="en-US" dirty="0"/>
+              <a:t>A local development SQL Server database</a:t>
+            </a:r>
+          </a:p>
+          <a:p>
+            <a:pPr lvl="1"/>
+            <a:r>
+              <a:rPr lang="en-US" dirty="0"/>
+              <a:t>A local integration SQL Server database</a:t>
+            </a:r>
+          </a:p>
+          <a:p>
+            <a:pPr lvl="1"/>
+            <a:r>
+              <a:rPr lang="en-US" dirty="0"/>
+              <a:t>A git repository, linked to a VSTS repository</a:t>
+            </a:r>
+          </a:p>
+          <a:p>
+            <a:pPr lvl="1"/>
+            <a:r>
+              <a:rPr lang="en-US" dirty="0"/>
+              <a:t>A local QA database</a:t>
+            </a:r>
+          </a:p>
+          <a:p>
+            <a:pPr lvl="1"/>
+            <a:r>
+              <a:rPr lang="en-US" dirty="0"/>
+              <a:t>A remote Azure SQL Database</a:t>
+            </a:r>
+          </a:p>
+          <a:p>
+            <a:pPr lvl="1"/>
+            <a:endParaRPr lang="en-US" dirty="0"/>
+          </a:p>
+        </p:txBody>
+      </p:sp>
+    </p:spTree>
+    <p:extLst>
+      <p:ext uri="{BB962C8B-B14F-4D97-AF65-F5344CB8AC3E}">
+        <p14:creationId xmlns:p14="http://schemas.microsoft.com/office/powerpoint/2010/main" val="2584114132"/>
+      </p:ext>
+    </p:extLst>
+  </p:cSld>
+  <p:clrMapOvr>
+    <a:masterClrMapping/>
+  </p:clrMapOvr>
+</p:sld>
+</file>
+
+<file path=ppt/slides/slide31.xml><?xml version="1.0" encoding="utf-8"?>
+<p:sld xmlns:a="http://schemas.openxmlformats.org/drawingml/2006/main" xmlns:r="http://schemas.openxmlformats.org/officeDocument/2006/relationships" xmlns:p="http://schemas.openxmlformats.org/presentationml/2006/main">
+  <p:cSld>
+    <p:spTree>
+      <p:nvGrpSpPr>
+        <p:cNvPr id="1" name=""/>
+        <p:cNvGrpSpPr/>
+        <p:nvPr/>
+      </p:nvGrpSpPr>
+      <p:grpSpPr>
+        <a:xfrm>
+          <a:off x="0" y="0"/>
+          <a:ext cx="0" cy="0"/>
+          <a:chOff x="0" y="0"/>
+          <a:chExt cx="0" cy="0"/>
+        </a:xfrm>
+      </p:grpSpPr>
+      <p:sp>
+        <p:nvSpPr>
+          <p:cNvPr id="2" name="Title 1"/>
+          <p:cNvSpPr>
+            <a:spLocks noGrp="1"/>
+          </p:cNvSpPr>
+          <p:nvPr>
+            <p:ph type="title"/>
+          </p:nvPr>
+        </p:nvSpPr>
+        <p:spPr/>
+        <p:txBody>
+          <a:bodyPr/>
+          <a:lstStyle/>
+          <a:p>
+            <a:r>
+              <a:rPr lang="en-US" dirty="0"/>
+              <a:t>Hands On Lab</a:t>
+            </a:r>
+          </a:p>
+        </p:txBody>
+      </p:sp>
+      <p:sp>
+        <p:nvSpPr>
+          <p:cNvPr id="3" name="Content Placeholder 2"/>
+          <p:cNvSpPr>
+            <a:spLocks noGrp="1"/>
+          </p:cNvSpPr>
+          <p:nvPr>
+            <p:ph idx="1"/>
+          </p:nvPr>
+        </p:nvSpPr>
+        <p:spPr/>
+        <p:txBody>
+          <a:bodyPr/>
+          <a:lstStyle/>
+          <a:p>
+            <a:r>
+              <a:rPr lang="en-US" dirty="0"/>
+              <a:t>Requirements</a:t>
+            </a:r>
+          </a:p>
+          <a:p>
+            <a:pPr lvl="1"/>
+            <a:r>
+              <a:rPr lang="en-US" dirty="0"/>
+              <a:t>A Windows host capable of supporting Visual Studio 2017 and SQL Server</a:t>
+            </a:r>
+            <a:endParaRPr lang="en-US" dirty="0">
+              <a:hlinkClick r:id="rId2"/>
+            </a:endParaRPr>
+          </a:p>
+          <a:p>
+            <a:pPr lvl="1"/>
+            <a:r>
+              <a:rPr lang="en-US" dirty="0">
+                <a:hlinkClick r:id="rId2"/>
+              </a:rPr>
+              <a:t>Visual Studio 2017 Enterprise </a:t>
+            </a:r>
+            <a:r>
+              <a:rPr lang="en-US" dirty="0"/>
+              <a:t>– an evaluation edition can be used</a:t>
+            </a:r>
+          </a:p>
+          <a:p>
+            <a:pPr lvl="1"/>
+            <a:r>
+              <a:rPr lang="en-US" dirty="0"/>
+              <a:t>SQL Server Developer Edition (</a:t>
+            </a:r>
+            <a:r>
+              <a:rPr lang="en-US" dirty="0" err="1"/>
+              <a:t>localdb</a:t>
+            </a:r>
+            <a:r>
+              <a:rPr lang="en-US"/>
+              <a:t> can be used)</a:t>
+            </a:r>
+            <a:endParaRPr lang="en-US" dirty="0"/>
+          </a:p>
+          <a:p>
+            <a:pPr lvl="1"/>
+            <a:r>
+              <a:rPr lang="en-US" dirty="0">
+                <a:hlinkClick r:id="rId3"/>
+              </a:rPr>
+              <a:t>The </a:t>
+            </a:r>
+            <a:r>
+              <a:rPr lang="en-US" dirty="0" err="1">
+                <a:hlinkClick r:id="rId3"/>
+              </a:rPr>
+              <a:t>tSQLt</a:t>
+            </a:r>
+            <a:r>
+              <a:rPr lang="en-US" dirty="0">
+                <a:hlinkClick r:id="rId3"/>
+              </a:rPr>
+              <a:t> testing framework</a:t>
+            </a:r>
+            <a:endParaRPr lang="en-US" dirty="0"/>
+          </a:p>
+          <a:p>
+            <a:pPr lvl="1"/>
+            <a:r>
+              <a:rPr lang="en-US" dirty="0">
+                <a:hlinkClick r:id="rId4"/>
+              </a:rPr>
+              <a:t>The </a:t>
+            </a:r>
+            <a:r>
+              <a:rPr lang="en-US" dirty="0" err="1">
+                <a:hlinkClick r:id="rId4"/>
+              </a:rPr>
+              <a:t>tSQLt</a:t>
+            </a:r>
+            <a:r>
+              <a:rPr lang="en-US" dirty="0">
+                <a:hlinkClick r:id="rId4"/>
+              </a:rPr>
+              <a:t> testing adapter</a:t>
+            </a:r>
+            <a:endParaRPr lang="en-US" dirty="0"/>
+          </a:p>
+          <a:p>
+            <a:pPr lvl="1"/>
+            <a:r>
+              <a:rPr lang="en-US" dirty="0"/>
+              <a:t>An Azure subscription – If you do not wish to use Azure, you can create a production database on your local machine</a:t>
+            </a:r>
+          </a:p>
+          <a:p>
+            <a:pPr lvl="1"/>
+            <a:endParaRPr lang="en-US" dirty="0"/>
+          </a:p>
+        </p:txBody>
+      </p:sp>
+    </p:spTree>
+    <p:extLst>
+      <p:ext uri="{BB962C8B-B14F-4D97-AF65-F5344CB8AC3E}">
+        <p14:creationId xmlns:p14="http://schemas.microsoft.com/office/powerpoint/2010/main" val="2171444207"/>
       </p:ext>
     </p:extLst>
   </p:cSld>
@@ -3678,90 +5850,443 @@
       </p:grpSpPr>
       <p:sp>
         <p:nvSpPr>
-          <p:cNvPr id="2" name="Title 1"/>
-          <p:cNvSpPr>
-            <a:spLocks noGrp="1"/>
-          </p:cNvSpPr>
-          <p:nvPr>
-            <p:ph type="title"/>
-          </p:nvPr>
-        </p:nvSpPr>
-        <p:spPr/>
-        <p:txBody>
-          <a:bodyPr/>
-          <a:lstStyle/>
-          <a:p>
-            <a:r>
-              <a:rPr lang="en-US" dirty="0"/>
-              <a:t>What is DevOps?</a:t>
-            </a:r>
-          </a:p>
-        </p:txBody>
-      </p:sp>
-      <p:sp>
-        <p:nvSpPr>
-          <p:cNvPr id="3" name="Content Placeholder 2"/>
-          <p:cNvSpPr>
-            <a:spLocks noGrp="1"/>
-          </p:cNvSpPr>
-          <p:nvPr>
-            <p:ph idx="1"/>
-          </p:nvPr>
-        </p:nvSpPr>
-        <p:spPr/>
-        <p:txBody>
-          <a:bodyPr/>
-          <a:lstStyle/>
-          <a:p>
-            <a:pPr marL="0" indent="0">
-              <a:buNone/>
+          <p:cNvPr id="18" name="Rectangle 17"/>
+          <p:cNvSpPr/>
+          <p:nvPr/>
+        </p:nvSpPr>
+        <p:spPr>
+          <a:xfrm>
+            <a:off x="5634574" y="2745757"/>
+            <a:ext cx="5298001" cy="646331"/>
+          </a:xfrm>
+          <a:prstGeom prst="rect">
+            <a:avLst/>
+          </a:prstGeom>
+        </p:spPr>
+        <p:txBody>
+          <a:bodyPr wrap="square">
+            <a:spAutoFit/>
+          </a:bodyPr>
+          <a:lstStyle/>
+          <a:p>
+            <a:pPr>
+              <a:spcAft>
+                <a:spcPts val="3600"/>
+              </a:spcAft>
             </a:pPr>
             <a:r>
-              <a:rPr lang="en-US" dirty="0"/>
-              <a:t>“DevOps is the union of people, process, and products to enable continuous delivery of value to our end users.”</a:t>
-            </a:r>
-          </a:p>
-          <a:p>
-            <a:pPr algn="r">
-              <a:buFontTx/>
-              <a:buChar char="-"/>
+              <a:rPr lang="en-US" sz="3600" dirty="0">
+                <a:solidFill>
+                  <a:schemeClr val="tx1">
+                    <a:lumMod val="50000"/>
+                    <a:lumOff val="50000"/>
+                  </a:schemeClr>
+                </a:solidFill>
+                <a:latin typeface="Microsoft Sans Serif" panose="020B0604020202020204" pitchFamily="34" charset="0"/>
+              </a:rPr>
+              <a:t>www.voiceofthedba.com</a:t>
+            </a:r>
+          </a:p>
+        </p:txBody>
+      </p:sp>
+      <p:sp>
+        <p:nvSpPr>
+          <p:cNvPr id="19" name="Rectangle 18"/>
+          <p:cNvSpPr/>
+          <p:nvPr/>
+        </p:nvSpPr>
+        <p:spPr>
+          <a:xfrm>
+            <a:off x="5634572" y="3679724"/>
+            <a:ext cx="5947829" cy="584775"/>
+          </a:xfrm>
+          <a:prstGeom prst="rect">
+            <a:avLst/>
+          </a:prstGeom>
+        </p:spPr>
+        <p:txBody>
+          <a:bodyPr wrap="square">
+            <a:spAutoFit/>
+          </a:bodyPr>
+          <a:lstStyle/>
+          <a:p>
+            <a:pPr>
+              <a:spcAft>
+                <a:spcPts val="3600"/>
+              </a:spcAft>
             </a:pPr>
             <a:r>
-              <a:rPr lang="en-US" i="1" dirty="0"/>
-              <a:t>Donovan Brown</a:t>
-            </a:r>
-          </a:p>
-          <a:p>
-            <a:pPr marL="0" indent="0" algn="r">
-              <a:buNone/>
+              <a:rPr lang="en-US" sz="3200" dirty="0" err="1">
+                <a:solidFill>
+                  <a:schemeClr val="tx1">
+                    <a:lumMod val="50000"/>
+                    <a:lumOff val="50000"/>
+                  </a:schemeClr>
+                </a:solidFill>
+                <a:latin typeface="Microsoft Sans Serif" panose="020B0604020202020204" pitchFamily="34" charset="0"/>
+              </a:rPr>
+              <a:t>sjones@sqlservercentral.com</a:t>
+            </a:r>
+            <a:endParaRPr lang="en-US" sz="3200" dirty="0">
+              <a:solidFill>
+                <a:schemeClr val="tx1">
+                  <a:lumMod val="50000"/>
+                  <a:lumOff val="50000"/>
+                </a:schemeClr>
+              </a:solidFill>
+              <a:latin typeface="Microsoft Sans Serif" panose="020B0604020202020204" pitchFamily="34" charset="0"/>
+            </a:endParaRPr>
+          </a:p>
+        </p:txBody>
+      </p:sp>
+      <p:sp>
+        <p:nvSpPr>
+          <p:cNvPr id="20" name="Rectangle 19"/>
+          <p:cNvSpPr/>
+          <p:nvPr/>
+        </p:nvSpPr>
+        <p:spPr>
+          <a:xfrm>
+            <a:off x="5634572" y="4590938"/>
+            <a:ext cx="4747693" cy="646331"/>
+          </a:xfrm>
+          <a:prstGeom prst="rect">
+            <a:avLst/>
+          </a:prstGeom>
+        </p:spPr>
+        <p:txBody>
+          <a:bodyPr wrap="square">
+            <a:spAutoFit/>
+          </a:bodyPr>
+          <a:lstStyle/>
+          <a:p>
+            <a:pPr>
+              <a:spcAft>
+                <a:spcPts val="3600"/>
+              </a:spcAft>
             </a:pPr>
             <a:r>
-              <a:rPr lang="en-US" i="1" dirty="0"/>
-              <a:t>Microsoft Principal DevOps PM</a:t>
-            </a:r>
-          </a:p>
-          <a:p>
-            <a:pPr marL="0" indent="0" algn="r">
-              <a:buNone/>
+              <a:rPr lang="en-US" sz="3600" dirty="0">
+                <a:solidFill>
+                  <a:schemeClr val="tx1">
+                    <a:lumMod val="50000"/>
+                    <a:lumOff val="50000"/>
+                  </a:schemeClr>
+                </a:solidFill>
+                <a:latin typeface="Microsoft Sans Serif" panose="020B0604020202020204" pitchFamily="34" charset="0"/>
+              </a:rPr>
+              <a:t>@way0utwest</a:t>
+            </a:r>
+          </a:p>
+        </p:txBody>
+      </p:sp>
+      <p:sp>
+        <p:nvSpPr>
+          <p:cNvPr id="21" name="TextBox 20"/>
+          <p:cNvSpPr txBox="1"/>
+          <p:nvPr/>
+        </p:nvSpPr>
+        <p:spPr>
+          <a:xfrm>
+            <a:off x="4730301" y="696291"/>
+            <a:ext cx="7080699" cy="1487651"/>
+          </a:xfrm>
+          <a:prstGeom prst="rect">
+            <a:avLst/>
+          </a:prstGeom>
+          <a:noFill/>
+        </p:spPr>
+        <p:txBody>
+          <a:bodyPr wrap="square" rtlCol="0">
+            <a:spAutoFit/>
+          </a:bodyPr>
+          <a:lstStyle/>
+          <a:p>
+            <a:r>
+              <a:rPr lang="en-US" sz="3733" b="1" dirty="0">
+                <a:solidFill>
+                  <a:srgbClr val="CC0000"/>
+                </a:solidFill>
+                <a:latin typeface="Arial"/>
+                <a:cs typeface="Arial"/>
+              </a:rPr>
+              <a:t>Steve Jones</a:t>
+            </a:r>
+          </a:p>
+          <a:p>
+            <a:r>
+              <a:rPr lang="en-US" sz="2667" b="1" dirty="0">
+                <a:solidFill>
+                  <a:srgbClr val="CC0000"/>
+                </a:solidFill>
+                <a:latin typeface="Arial"/>
+                <a:cs typeface="Arial"/>
+              </a:rPr>
+              <a:t>SQLServerCentral Founder</a:t>
+            </a:r>
+          </a:p>
+          <a:p>
+            <a:r>
+              <a:rPr lang="en-US" sz="2667" b="1" dirty="0" err="1">
+                <a:solidFill>
+                  <a:srgbClr val="CC0000"/>
+                </a:solidFill>
+                <a:latin typeface="Arial"/>
+                <a:cs typeface="Arial"/>
+              </a:rPr>
+              <a:t>Redgate</a:t>
+            </a:r>
+            <a:r>
+              <a:rPr lang="en-US" sz="2667" b="1" dirty="0">
+                <a:solidFill>
+                  <a:srgbClr val="CC0000"/>
+                </a:solidFill>
+                <a:latin typeface="Arial"/>
+                <a:cs typeface="Arial"/>
+              </a:rPr>
+              <a:t> Software Evangelist</a:t>
+            </a:r>
+          </a:p>
+        </p:txBody>
+      </p:sp>
+      <p:pic>
+        <p:nvPicPr>
+          <p:cNvPr id="22" name="Picture 21"/>
+          <p:cNvPicPr>
+            <a:picLocks noChangeAspect="1"/>
+          </p:cNvPicPr>
+          <p:nvPr/>
+        </p:nvPicPr>
+        <p:blipFill>
+          <a:blip r:embed="rId3"/>
+          <a:stretch>
+            <a:fillRect/>
+          </a:stretch>
+        </p:blipFill>
+        <p:spPr>
+          <a:xfrm>
+            <a:off x="4873402" y="2785699"/>
+            <a:ext cx="579705" cy="637676"/>
+          </a:xfrm>
+          <a:prstGeom prst="rect">
+            <a:avLst/>
+          </a:prstGeom>
+        </p:spPr>
+      </p:pic>
+      <p:pic>
+        <p:nvPicPr>
+          <p:cNvPr id="23" name="Picture 22"/>
+          <p:cNvPicPr>
+            <a:picLocks noChangeAspect="1"/>
+          </p:cNvPicPr>
+          <p:nvPr/>
+        </p:nvPicPr>
+        <p:blipFill>
+          <a:blip r:embed="rId4"/>
+          <a:stretch>
+            <a:fillRect/>
+          </a:stretch>
+        </p:blipFill>
+        <p:spPr>
+          <a:xfrm>
+            <a:off x="4873402" y="3806721"/>
+            <a:ext cx="617980" cy="505619"/>
+          </a:xfrm>
+          <a:prstGeom prst="rect">
+            <a:avLst/>
+          </a:prstGeom>
+        </p:spPr>
+      </p:pic>
+      <p:pic>
+        <p:nvPicPr>
+          <p:cNvPr id="24" name="Picture 23"/>
+          <p:cNvPicPr>
+            <a:picLocks noChangeAspect="1"/>
+          </p:cNvPicPr>
+          <p:nvPr/>
+        </p:nvPicPr>
+        <p:blipFill>
+          <a:blip r:embed="rId5"/>
+          <a:stretch>
+            <a:fillRect/>
+          </a:stretch>
+        </p:blipFill>
+        <p:spPr>
+          <a:xfrm>
+            <a:off x="4873399" y="4641736"/>
+            <a:ext cx="673123" cy="617029"/>
+          </a:xfrm>
+          <a:prstGeom prst="rect">
+            <a:avLst/>
+          </a:prstGeom>
+        </p:spPr>
+      </p:pic>
+      <p:pic>
+        <p:nvPicPr>
+          <p:cNvPr id="3" name="Picture 2"/>
+          <p:cNvPicPr>
+            <a:picLocks noChangeAspect="1"/>
+          </p:cNvPicPr>
+          <p:nvPr/>
+        </p:nvPicPr>
+        <p:blipFill>
+          <a:blip r:embed="rId6">
+            <a:extLst>
+              <a:ext uri="{28A0092B-C50C-407E-A947-70E740481C1C}">
+                <a14:useLocalDpi xmlns:a14="http://schemas.microsoft.com/office/drawing/2010/main" val="0"/>
+              </a:ext>
+            </a:extLst>
+          </a:blip>
+          <a:stretch>
+            <a:fillRect/>
+          </a:stretch>
+        </p:blipFill>
+        <p:spPr>
+          <a:xfrm>
+            <a:off x="4873399" y="5485533"/>
+            <a:ext cx="661235" cy="661235"/>
+          </a:xfrm>
+          <a:prstGeom prst="rect">
+            <a:avLst/>
+          </a:prstGeom>
+        </p:spPr>
+      </p:pic>
+      <p:sp>
+        <p:nvSpPr>
+          <p:cNvPr id="4" name="TextBox 3"/>
+          <p:cNvSpPr txBox="1"/>
+          <p:nvPr/>
+        </p:nvSpPr>
+        <p:spPr>
+          <a:xfrm>
+            <a:off x="5634574" y="5485534"/>
+            <a:ext cx="4008297" cy="646331"/>
+          </a:xfrm>
+          <a:prstGeom prst="rect">
+            <a:avLst/>
+          </a:prstGeom>
+          <a:noFill/>
+        </p:spPr>
+        <p:txBody>
+          <a:bodyPr wrap="square" rtlCol="0">
+            <a:spAutoFit/>
+          </a:bodyPr>
+          <a:lstStyle/>
+          <a:p>
+            <a:pPr>
+              <a:spcAft>
+                <a:spcPts val="3600"/>
+              </a:spcAft>
             </a:pPr>
             <a:r>
-              <a:rPr lang="en-US" sz="1800" dirty="0"/>
-              <a:t>From </a:t>
-            </a:r>
-            <a:r>
-              <a:rPr lang="en-US" sz="1800" dirty="0">
-                <a:hlinkClick r:id="rId2" action="ppaction://hlinkfile"/>
+              <a:rPr lang="en-US" sz="3600" dirty="0">
+                <a:solidFill>
+                  <a:schemeClr val="tx1">
+                    <a:lumMod val="50000"/>
+                    <a:lumOff val="50000"/>
+                  </a:schemeClr>
+                </a:solidFill>
+                <a:latin typeface="Microsoft Sans Serif" panose="020B0604020202020204" pitchFamily="34" charset="0"/>
               </a:rPr>
-              <a:t>http://donovanbrown.com/post/what-is-devops</a:t>
-            </a:r>
-            <a:endParaRPr lang="en-US" sz="1800" dirty="0"/>
-          </a:p>
-        </p:txBody>
-      </p:sp>
+              <a:t>/in/way0utwest</a:t>
+            </a:r>
+          </a:p>
+        </p:txBody>
+      </p:sp>
+      <p:pic>
+        <p:nvPicPr>
+          <p:cNvPr id="13" name="Picture 12"/>
+          <p:cNvPicPr>
+            <a:picLocks noChangeAspect="1"/>
+          </p:cNvPicPr>
+          <p:nvPr/>
+        </p:nvPicPr>
+        <p:blipFill>
+          <a:blip r:embed="rId7">
+            <a:extLst>
+              <a:ext uri="{28A0092B-C50C-407E-A947-70E740481C1C}">
+                <a14:useLocalDpi xmlns:a14="http://schemas.microsoft.com/office/drawing/2010/main" val="0"/>
+              </a:ext>
+            </a:extLst>
+          </a:blip>
+          <a:stretch>
+            <a:fillRect/>
+          </a:stretch>
+        </p:blipFill>
+        <p:spPr>
+          <a:xfrm>
+            <a:off x="9642871" y="5268046"/>
+            <a:ext cx="2014815" cy="711111"/>
+          </a:xfrm>
+          <a:prstGeom prst="rect">
+            <a:avLst/>
+          </a:prstGeom>
+        </p:spPr>
+      </p:pic>
+      <p:pic>
+        <p:nvPicPr>
+          <p:cNvPr id="14" name="Picture 13"/>
+          <p:cNvPicPr>
+            <a:picLocks noChangeAspect="1"/>
+          </p:cNvPicPr>
+          <p:nvPr/>
+        </p:nvPicPr>
+        <p:blipFill>
+          <a:blip r:embed="rId8">
+            <a:extLst>
+              <a:ext uri="{28A0092B-C50C-407E-A947-70E740481C1C}">
+                <a14:useLocalDpi xmlns:a14="http://schemas.microsoft.com/office/drawing/2010/main" val="0"/>
+              </a:ext>
+            </a:extLst>
+          </a:blip>
+          <a:stretch>
+            <a:fillRect/>
+          </a:stretch>
+        </p:blipFill>
+        <p:spPr>
+          <a:xfrm>
+            <a:off x="1048158" y="5032217"/>
+            <a:ext cx="2922244" cy="1034961"/>
+          </a:xfrm>
+          <a:prstGeom prst="rect">
+            <a:avLst/>
+          </a:prstGeom>
+        </p:spPr>
+      </p:pic>
+      <p:pic>
+        <p:nvPicPr>
+          <p:cNvPr id="5" name="Picture 4"/>
+          <p:cNvPicPr>
+            <a:picLocks noChangeAspect="1"/>
+          </p:cNvPicPr>
+          <p:nvPr/>
+        </p:nvPicPr>
+        <p:blipFill>
+          <a:blip r:embed="rId9">
+            <a:extLst>
+              <a:ext uri="{28A0092B-C50C-407E-A947-70E740481C1C}">
+                <a14:useLocalDpi xmlns:a14="http://schemas.microsoft.com/office/drawing/2010/main" val="0"/>
+              </a:ext>
+            </a:extLst>
+          </a:blip>
+          <a:stretch>
+            <a:fillRect/>
+          </a:stretch>
+        </p:blipFill>
+        <p:spPr>
+          <a:xfrm>
+            <a:off x="1431590" y="1871203"/>
+            <a:ext cx="1904762" cy="2466667"/>
+          </a:xfrm>
+          <a:prstGeom prst="rect">
+            <a:avLst/>
+          </a:prstGeom>
+        </p:spPr>
+      </p:pic>
     </p:spTree>
     <p:extLst>
       <p:ext uri="{BB962C8B-B14F-4D97-AF65-F5344CB8AC3E}">
-        <p14:creationId xmlns:p14="http://schemas.microsoft.com/office/powerpoint/2010/main" val="1659003174"/>
+        <p14:creationId xmlns:p14="http://schemas.microsoft.com/office/powerpoint/2010/main" val="1725550143"/>
       </p:ext>
     </p:extLst>
   </p:cSld>
@@ -3805,7 +6330,7 @@
           <a:p>
             <a:r>
               <a:rPr lang="en-US" dirty="0"/>
-              <a:t>What is DevOps?</a:t>
+              <a:t>Course Structure</a:t>
             </a:r>
           </a:p>
         </p:txBody>
@@ -3825,32 +6350,38 @@
           <a:bodyPr/>
           <a:lstStyle/>
           <a:p>
-            <a:pPr marL="0" indent="0">
-              <a:buNone/>
-            </a:pPr>
-            <a:r>
-              <a:rPr lang="en-US" i="1" dirty="0"/>
-              <a:t>“It is very important to realize that DevOps is not a product.  You cannot buy DevOps and install it.  DevOps is not just automation or infrastructure as code.  DevOps is people following a process enabled by products to deliver value to our end users.”</a:t>
-            </a:r>
-          </a:p>
-          <a:p>
-            <a:pPr marL="0" indent="0" algn="r">
-              <a:buNone/>
-            </a:pPr>
-            <a:r>
-              <a:rPr lang="en-US" dirty="0"/>
-              <a:t>- Donovan Brown</a:t>
-            </a:r>
-          </a:p>
-          <a:p>
-            <a:endParaRPr lang="en-US" dirty="0"/>
+            <a:r>
+              <a:rPr lang="en-US" dirty="0"/>
+              <a:t>This course consists of</a:t>
+            </a:r>
+          </a:p>
+          <a:p>
+            <a:pPr lvl="1"/>
+            <a:r>
+              <a:rPr lang="en-US" dirty="0"/>
+              <a:t>Lectures and videos of course material</a:t>
+            </a:r>
+          </a:p>
+          <a:p>
+            <a:pPr lvl="1"/>
+            <a:r>
+              <a:rPr lang="en-US" dirty="0"/>
+              <a:t>Assessment questions after each section</a:t>
+            </a:r>
+          </a:p>
+          <a:p>
+            <a:pPr lvl="1"/>
+            <a:r>
+              <a:rPr lang="en-US" dirty="0"/>
+              <a:t>Hands on labs for you to practice skills</a:t>
+            </a:r>
           </a:p>
         </p:txBody>
       </p:sp>
     </p:spTree>
     <p:extLst>
       <p:ext uri="{BB962C8B-B14F-4D97-AF65-F5344CB8AC3E}">
-        <p14:creationId xmlns:p14="http://schemas.microsoft.com/office/powerpoint/2010/main" val="2606710913"/>
+        <p14:creationId xmlns:p14="http://schemas.microsoft.com/office/powerpoint/2010/main" val="3810271598"/>
       </p:ext>
     </p:extLst>
   </p:cSld>
@@ -3894,7 +6425,7 @@
           <a:p>
             <a:r>
               <a:rPr lang="en-US" dirty="0"/>
-              <a:t>The Three Ways</a:t>
+              <a:t>Course Overview</a:t>
             </a:r>
           </a:p>
         </p:txBody>
@@ -3916,39 +6447,57 @@
           <a:p>
             <a:r>
               <a:rPr lang="en-US" dirty="0"/>
-              <a:t>Gene Kim of The Phoenix Project and The DevOps Handbook, lists three core principles of DevOps</a:t>
+              <a:t>In this course, you will learn how to:</a:t>
             </a:r>
           </a:p>
           <a:p>
             <a:pPr lvl="1"/>
             <a:r>
               <a:rPr lang="en-US" dirty="0"/>
-              <a:t>Systems Thinking</a:t>
+              <a:t>Define DevOps</a:t>
             </a:r>
           </a:p>
           <a:p>
             <a:pPr lvl="1"/>
             <a:r>
               <a:rPr lang="en-US" dirty="0"/>
-              <a:t>Feedback Loops</a:t>
+              <a:t>Identify the challenges of database DevOps</a:t>
             </a:r>
           </a:p>
           <a:p>
             <a:pPr lvl="1"/>
             <a:r>
               <a:rPr lang="en-US" dirty="0"/>
-              <a:t>Culture of Continuous Learning and Experimentation</a:t>
-            </a:r>
-          </a:p>
-          <a:p>
-            <a:endParaRPr lang="en-US" dirty="0"/>
+              <a:t>Include your database code alongside other application code in source control</a:t>
+            </a:r>
+          </a:p>
+          <a:p>
+            <a:pPr lvl="1"/>
+            <a:r>
+              <a:rPr lang="en-US" dirty="0"/>
+              <a:t>Setup a Continuous Integration (CI) platform for your database code.</a:t>
+            </a:r>
+          </a:p>
+          <a:p>
+            <a:pPr lvl="1"/>
+            <a:r>
+              <a:rPr lang="en-US" dirty="0"/>
+              <a:t>Write and include automated unit tests for your database code.</a:t>
+            </a:r>
+          </a:p>
+          <a:p>
+            <a:pPr lvl="1"/>
+            <a:r>
+              <a:rPr lang="en-US" dirty="0"/>
+              <a:t>Develop an automated release process that deploys database changes</a:t>
+            </a:r>
           </a:p>
         </p:txBody>
       </p:sp>
     </p:spTree>
     <p:extLst>
       <p:ext uri="{BB962C8B-B14F-4D97-AF65-F5344CB8AC3E}">
-        <p14:creationId xmlns:p14="http://schemas.microsoft.com/office/powerpoint/2010/main" val="2497169468"/>
+        <p14:creationId xmlns:p14="http://schemas.microsoft.com/office/powerpoint/2010/main" val="131535962"/>
       </p:ext>
     </p:extLst>
   </p:cSld>
@@ -3977,244 +6526,30 @@
       </p:grpSpPr>
       <p:sp>
         <p:nvSpPr>
-          <p:cNvPr id="1030" name="Rectangle 1029"/>
-          <p:cNvSpPr>
-            <a:spLocks noGrp="1" noRot="1" noChangeAspect="1" noMove="1" noResize="1" noEditPoints="1" noAdjustHandles="1" noChangeArrowheads="1" noChangeShapeType="1" noTextEdit="1"/>
-          </p:cNvSpPr>
-          <p:nvPr>
-            <p:extLst>
-              <p:ext uri="{386F3935-93C4-4BCD-93E2-E3B085C9AB24}">
-                <p16:designElem xmlns:p16="http://schemas.microsoft.com/office/powerpoint/2015/main" val="1"/>
-              </p:ext>
-            </p:extLst>
-          </p:nvPr>
-        </p:nvSpPr>
-        <p:spPr bwMode="white">
-          <a:xfrm>
-            <a:off x="0" y="0"/>
-            <a:ext cx="12192000" cy="6858000"/>
-          </a:xfrm>
-          <a:prstGeom prst="rect">
-            <a:avLst/>
-          </a:prstGeom>
-          <a:solidFill>
-            <a:schemeClr val="bg1"/>
-          </a:solidFill>
-          <a:ln>
-            <a:noFill/>
-          </a:ln>
-          <a:effectLst/>
-        </p:spPr>
-      </p:sp>
-      <p:sp>
-        <p:nvSpPr>
-          <p:cNvPr id="72" name="Rectangle 71"/>
-          <p:cNvSpPr>
-            <a:spLocks noGrp="1" noRot="1" noChangeAspect="1" noMove="1" noResize="1" noEditPoints="1" noAdjustHandles="1" noChangeArrowheads="1" noChangeShapeType="1" noTextEdit="1"/>
-          </p:cNvSpPr>
-          <p:nvPr>
-            <p:extLst>
-              <p:ext uri="{386F3935-93C4-4BCD-93E2-E3B085C9AB24}">
-                <p16:designElem xmlns:p16="http://schemas.microsoft.com/office/powerpoint/2015/main" val="1"/>
-              </p:ext>
-            </p:extLst>
-          </p:nvPr>
-        </p:nvSpPr>
-        <p:spPr>
-          <a:xfrm>
-            <a:off x="0" y="0"/>
-            <a:ext cx="12192000" cy="6858000"/>
-          </a:xfrm>
-          <a:prstGeom prst="rect">
-            <a:avLst/>
-          </a:prstGeom>
-          <a:solidFill>
-            <a:schemeClr val="bg1">
-              <a:lumMod val="75000"/>
-            </a:schemeClr>
-          </a:solidFill>
-          <a:ln>
-            <a:noFill/>
-          </a:ln>
-        </p:spPr>
-        <p:style>
-          <a:lnRef idx="2">
-            <a:schemeClr val="accent1">
-              <a:shade val="50000"/>
-            </a:schemeClr>
-          </a:lnRef>
-          <a:fillRef idx="1">
-            <a:schemeClr val="accent1"/>
-          </a:fillRef>
-          <a:effectRef idx="0">
-            <a:schemeClr val="accent1"/>
-          </a:effectRef>
-          <a:fontRef idx="minor">
-            <a:schemeClr val="lt1"/>
-          </a:fontRef>
-        </p:style>
-        <p:txBody>
-          <a:bodyPr rtlCol="0" anchor="ctr"/>
-          <a:lstStyle/>
-          <a:p>
-            <a:pPr algn="ctr"/>
-            <a:endParaRPr lang="en-US"/>
-          </a:p>
-        </p:txBody>
-      </p:sp>
-      <p:sp>
-        <p:nvSpPr>
-          <p:cNvPr id="74" name="Rectangle 73"/>
-          <p:cNvSpPr>
-            <a:spLocks noGrp="1" noRot="1" noChangeAspect="1" noMove="1" noResize="1" noEditPoints="1" noAdjustHandles="1" noChangeArrowheads="1" noChangeShapeType="1" noTextEdit="1"/>
-          </p:cNvSpPr>
-          <p:nvPr>
-            <p:extLst>
-              <p:ext uri="{386F3935-93C4-4BCD-93E2-E3B085C9AB24}">
-                <p16:designElem xmlns:p16="http://schemas.microsoft.com/office/powerpoint/2015/main" val="1"/>
-              </p:ext>
-            </p:extLst>
-          </p:nvPr>
-        </p:nvSpPr>
-        <p:spPr>
-          <a:xfrm>
-            <a:off x="477012" y="480060"/>
-            <a:ext cx="11237976" cy="5897880"/>
-          </a:xfrm>
-          <a:prstGeom prst="rect">
-            <a:avLst/>
-          </a:prstGeom>
-          <a:noFill/>
-          <a:ln>
-            <a:solidFill>
-              <a:schemeClr val="bg1"/>
-            </a:solidFill>
-          </a:ln>
-        </p:spPr>
-        <p:style>
-          <a:lnRef idx="2">
-            <a:schemeClr val="accent1">
-              <a:shade val="50000"/>
-            </a:schemeClr>
-          </a:lnRef>
-          <a:fillRef idx="1">
-            <a:schemeClr val="accent1"/>
-          </a:fillRef>
-          <a:effectRef idx="0">
-            <a:schemeClr val="accent1"/>
-          </a:effectRef>
-          <a:fontRef idx="minor">
-            <a:schemeClr val="lt1"/>
-          </a:fontRef>
-        </p:style>
-        <p:txBody>
-          <a:bodyPr rtlCol="0" anchor="ctr"/>
-          <a:lstStyle/>
-          <a:p>
-            <a:pPr algn="ctr"/>
-            <a:endParaRPr lang="en-US"/>
-          </a:p>
-        </p:txBody>
-      </p:sp>
-      <p:sp>
-        <p:nvSpPr>
-          <p:cNvPr id="76" name="Rectangle 75"/>
-          <p:cNvSpPr>
-            <a:spLocks noGrp="1" noRot="1" noChangeAspect="1" noMove="1" noResize="1" noEditPoints="1" noAdjustHandles="1" noChangeArrowheads="1" noChangeShapeType="1" noTextEdit="1"/>
-          </p:cNvSpPr>
-          <p:nvPr>
-            <p:extLst>
-              <p:ext uri="{386F3935-93C4-4BCD-93E2-E3B085C9AB24}">
-                <p16:designElem xmlns:p16="http://schemas.microsoft.com/office/powerpoint/2015/main" val="1"/>
-              </p:ext>
-            </p:extLst>
-          </p:nvPr>
-        </p:nvSpPr>
-        <p:spPr>
-          <a:xfrm>
-            <a:off x="643466" y="643468"/>
-            <a:ext cx="10905067" cy="5571066"/>
-          </a:xfrm>
-          <a:prstGeom prst="rect">
-            <a:avLst/>
-          </a:prstGeom>
-          <a:solidFill>
-            <a:srgbClr val="FFFFFF"/>
-          </a:solidFill>
-          <a:ln>
-            <a:noFill/>
-          </a:ln>
-        </p:spPr>
-        <p:style>
-          <a:lnRef idx="2">
-            <a:schemeClr val="accent1">
-              <a:shade val="50000"/>
-            </a:schemeClr>
-          </a:lnRef>
-          <a:fillRef idx="1">
-            <a:schemeClr val="accent1"/>
-          </a:fillRef>
-          <a:effectRef idx="0">
-            <a:schemeClr val="accent1"/>
-          </a:effectRef>
-          <a:fontRef idx="minor">
-            <a:schemeClr val="lt1"/>
-          </a:fontRef>
-        </p:style>
-        <p:txBody>
-          <a:bodyPr rtlCol="0" anchor="ctr"/>
-          <a:lstStyle/>
-          <a:p>
-            <a:pPr algn="ctr"/>
-            <a:endParaRPr lang="en-US"/>
-          </a:p>
-        </p:txBody>
-      </p:sp>
-      <p:pic>
-        <p:nvPicPr>
-          <p:cNvPr id="1026" name="Picture 2" descr="http://itrevolution.com/wp-content/uploads/2012/08/first-way2-400x191.png">
-            <a:hlinkClick r:id="rId2"/>
-          </p:cNvPr>
-          <p:cNvPicPr>
-            <a:picLocks noChangeAspect="1" noChangeArrowheads="1"/>
-          </p:cNvPicPr>
-          <p:nvPr/>
-        </p:nvPicPr>
-        <p:blipFill rotWithShape="1">
-          <a:blip r:embed="rId3">
-            <a:extLst>
-              <a:ext uri="{28A0092B-C50C-407E-A947-70E740481C1C}">
-                <a14:useLocalDpi xmlns:a14="http://schemas.microsoft.com/office/drawing/2010/main" val="0"/>
-              </a:ext>
-            </a:extLst>
-          </a:blip>
-          <a:srcRect/>
-          <a:stretch/>
-        </p:blipFill>
-        <p:spPr bwMode="auto">
-          <a:xfrm>
-            <a:off x="1274217" y="1123527"/>
-            <a:ext cx="9643560" cy="4604800"/>
-          </a:xfrm>
-          <a:prstGeom prst="rect">
-            <a:avLst/>
-          </a:prstGeom>
-          <a:noFill/>
-          <a:extLst>
-            <a:ext uri="{909E8E84-426E-40DD-AFC4-6F175D3DCCD1}">
-              <a14:hiddenFill xmlns:a14="http://schemas.microsoft.com/office/drawing/2010/main">
-                <a:solidFill>
-                  <a:srgbClr val="FFFFFF"/>
-                </a:solidFill>
-              </a14:hiddenFill>
-            </a:ext>
-          </a:extLst>
-        </p:spPr>
-      </p:pic>
+          <p:cNvPr id="4" name="Title 3"/>
+          <p:cNvSpPr>
+            <a:spLocks noGrp="1"/>
+          </p:cNvSpPr>
+          <p:nvPr>
+            <p:ph type="ctrTitle"/>
+          </p:nvPr>
+        </p:nvSpPr>
+        <p:spPr/>
+        <p:txBody>
+          <a:bodyPr/>
+          <a:lstStyle/>
+          <a:p>
+            <a:r>
+              <a:rPr lang="en-US" dirty="0"/>
+              <a:t>1.2 – What is DevOps?</a:t>
+            </a:r>
+          </a:p>
+        </p:txBody>
+      </p:sp>
     </p:spTree>
     <p:extLst>
       <p:ext uri="{BB962C8B-B14F-4D97-AF65-F5344CB8AC3E}">
-        <p14:creationId xmlns:p14="http://schemas.microsoft.com/office/powerpoint/2010/main" val="3152318875"/>
+        <p14:creationId xmlns:p14="http://schemas.microsoft.com/office/powerpoint/2010/main" val="2853242530"/>
       </p:ext>
     </p:extLst>
   </p:cSld>
@@ -4243,242 +6578,90 @@
       </p:grpSpPr>
       <p:sp>
         <p:nvSpPr>
-          <p:cNvPr id="2054" name="Rectangle 2053"/>
-          <p:cNvSpPr>
-            <a:spLocks noGrp="1" noRot="1" noChangeAspect="1" noMove="1" noResize="1" noEditPoints="1" noAdjustHandles="1" noChangeArrowheads="1" noChangeShapeType="1" noTextEdit="1"/>
-          </p:cNvSpPr>
-          <p:nvPr>
-            <p:extLst>
-              <p:ext uri="{386F3935-93C4-4BCD-93E2-E3B085C9AB24}">
-                <p16:designElem xmlns:p16="http://schemas.microsoft.com/office/powerpoint/2015/main" val="1"/>
-              </p:ext>
-            </p:extLst>
-          </p:nvPr>
-        </p:nvSpPr>
-        <p:spPr bwMode="white">
-          <a:xfrm>
-            <a:off x="0" y="0"/>
-            <a:ext cx="12192000" cy="6858000"/>
-          </a:xfrm>
-          <a:prstGeom prst="rect">
-            <a:avLst/>
-          </a:prstGeom>
-          <a:solidFill>
-            <a:schemeClr val="bg1"/>
-          </a:solidFill>
-          <a:ln>
-            <a:noFill/>
-          </a:ln>
-          <a:effectLst/>
-        </p:spPr>
-      </p:sp>
-      <p:sp>
-        <p:nvSpPr>
-          <p:cNvPr id="72" name="Rectangle 71"/>
-          <p:cNvSpPr>
-            <a:spLocks noGrp="1" noRot="1" noChangeAspect="1" noMove="1" noResize="1" noEditPoints="1" noAdjustHandles="1" noChangeArrowheads="1" noChangeShapeType="1" noTextEdit="1"/>
-          </p:cNvSpPr>
-          <p:nvPr>
-            <p:extLst>
-              <p:ext uri="{386F3935-93C4-4BCD-93E2-E3B085C9AB24}">
-                <p16:designElem xmlns:p16="http://schemas.microsoft.com/office/powerpoint/2015/main" val="1"/>
-              </p:ext>
-            </p:extLst>
-          </p:nvPr>
-        </p:nvSpPr>
-        <p:spPr>
-          <a:xfrm>
-            <a:off x="0" y="0"/>
-            <a:ext cx="12192000" cy="6858000"/>
-          </a:xfrm>
-          <a:prstGeom prst="rect">
-            <a:avLst/>
-          </a:prstGeom>
-          <a:solidFill>
-            <a:schemeClr val="bg1">
-              <a:lumMod val="75000"/>
-            </a:schemeClr>
-          </a:solidFill>
-          <a:ln>
-            <a:noFill/>
-          </a:ln>
-        </p:spPr>
-        <p:style>
-          <a:lnRef idx="2">
-            <a:schemeClr val="accent1">
-              <a:shade val="50000"/>
-            </a:schemeClr>
-          </a:lnRef>
-          <a:fillRef idx="1">
-            <a:schemeClr val="accent1"/>
-          </a:fillRef>
-          <a:effectRef idx="0">
-            <a:schemeClr val="accent1"/>
-          </a:effectRef>
-          <a:fontRef idx="minor">
-            <a:schemeClr val="lt1"/>
-          </a:fontRef>
-        </p:style>
-        <p:txBody>
-          <a:bodyPr rtlCol="0" anchor="ctr"/>
-          <a:lstStyle/>
-          <a:p>
-            <a:pPr algn="ctr"/>
-            <a:endParaRPr lang="en-US"/>
-          </a:p>
-        </p:txBody>
-      </p:sp>
-      <p:sp>
-        <p:nvSpPr>
-          <p:cNvPr id="74" name="Rectangle 73"/>
-          <p:cNvSpPr>
-            <a:spLocks noGrp="1" noRot="1" noChangeAspect="1" noMove="1" noResize="1" noEditPoints="1" noAdjustHandles="1" noChangeArrowheads="1" noChangeShapeType="1" noTextEdit="1"/>
-          </p:cNvSpPr>
-          <p:nvPr>
-            <p:extLst>
-              <p:ext uri="{386F3935-93C4-4BCD-93E2-E3B085C9AB24}">
-                <p16:designElem xmlns:p16="http://schemas.microsoft.com/office/powerpoint/2015/main" val="1"/>
-              </p:ext>
-            </p:extLst>
-          </p:nvPr>
-        </p:nvSpPr>
-        <p:spPr>
-          <a:xfrm>
-            <a:off x="477012" y="480060"/>
-            <a:ext cx="11237976" cy="5897880"/>
-          </a:xfrm>
-          <a:prstGeom prst="rect">
-            <a:avLst/>
-          </a:prstGeom>
-          <a:noFill/>
-          <a:ln>
-            <a:solidFill>
-              <a:schemeClr val="bg1"/>
-            </a:solidFill>
-          </a:ln>
-        </p:spPr>
-        <p:style>
-          <a:lnRef idx="2">
-            <a:schemeClr val="accent1">
-              <a:shade val="50000"/>
-            </a:schemeClr>
-          </a:lnRef>
-          <a:fillRef idx="1">
-            <a:schemeClr val="accent1"/>
-          </a:fillRef>
-          <a:effectRef idx="0">
-            <a:schemeClr val="accent1"/>
-          </a:effectRef>
-          <a:fontRef idx="minor">
-            <a:schemeClr val="lt1"/>
-          </a:fontRef>
-        </p:style>
-        <p:txBody>
-          <a:bodyPr rtlCol="0" anchor="ctr"/>
-          <a:lstStyle/>
-          <a:p>
-            <a:pPr algn="ctr"/>
-            <a:endParaRPr lang="en-US"/>
-          </a:p>
-        </p:txBody>
-      </p:sp>
-      <p:sp>
-        <p:nvSpPr>
-          <p:cNvPr id="76" name="Rectangle 75"/>
-          <p:cNvSpPr>
-            <a:spLocks noGrp="1" noRot="1" noChangeAspect="1" noMove="1" noResize="1" noEditPoints="1" noAdjustHandles="1" noChangeArrowheads="1" noChangeShapeType="1" noTextEdit="1"/>
-          </p:cNvSpPr>
-          <p:nvPr>
-            <p:extLst>
-              <p:ext uri="{386F3935-93C4-4BCD-93E2-E3B085C9AB24}">
-                <p16:designElem xmlns:p16="http://schemas.microsoft.com/office/powerpoint/2015/main" val="1"/>
-              </p:ext>
-            </p:extLst>
-          </p:nvPr>
-        </p:nvSpPr>
-        <p:spPr>
-          <a:xfrm>
-            <a:off x="643466" y="643468"/>
-            <a:ext cx="10905067" cy="5571066"/>
-          </a:xfrm>
-          <a:prstGeom prst="rect">
-            <a:avLst/>
-          </a:prstGeom>
-          <a:solidFill>
-            <a:srgbClr val="FFFFFF"/>
-          </a:solidFill>
-          <a:ln>
-            <a:noFill/>
-          </a:ln>
-        </p:spPr>
-        <p:style>
-          <a:lnRef idx="2">
-            <a:schemeClr val="accent1">
-              <a:shade val="50000"/>
-            </a:schemeClr>
-          </a:lnRef>
-          <a:fillRef idx="1">
-            <a:schemeClr val="accent1"/>
-          </a:fillRef>
-          <a:effectRef idx="0">
-            <a:schemeClr val="accent1"/>
-          </a:effectRef>
-          <a:fontRef idx="minor">
-            <a:schemeClr val="lt1"/>
-          </a:fontRef>
-        </p:style>
-        <p:txBody>
-          <a:bodyPr rtlCol="0" anchor="ctr"/>
-          <a:lstStyle/>
-          <a:p>
-            <a:pPr algn="ctr"/>
-            <a:endParaRPr lang="en-US"/>
-          </a:p>
-        </p:txBody>
-      </p:sp>
-      <p:pic>
-        <p:nvPicPr>
-          <p:cNvPr id="2050" name="Picture 2" descr="http://itrevolution.com/wp-content/uploads/2012/08/second-way1-400x211.png"/>
-          <p:cNvPicPr>
-            <a:picLocks noChangeAspect="1" noChangeArrowheads="1"/>
-          </p:cNvPicPr>
-          <p:nvPr/>
-        </p:nvPicPr>
-        <p:blipFill rotWithShape="1">
-          <a:blip r:embed="rId2">
-            <a:extLst>
-              <a:ext uri="{28A0092B-C50C-407E-A947-70E740481C1C}">
-                <a14:useLocalDpi xmlns:a14="http://schemas.microsoft.com/office/drawing/2010/main" val="0"/>
-              </a:ext>
-            </a:extLst>
-          </a:blip>
-          <a:srcRect/>
-          <a:stretch/>
-        </p:blipFill>
-        <p:spPr bwMode="auto">
-          <a:xfrm>
-            <a:off x="1731258" y="1123527"/>
-            <a:ext cx="8729478" cy="4604800"/>
-          </a:xfrm>
-          <a:prstGeom prst="rect">
-            <a:avLst/>
-          </a:prstGeom>
-          <a:noFill/>
-          <a:extLst>
-            <a:ext uri="{909E8E84-426E-40DD-AFC4-6F175D3DCCD1}">
-              <a14:hiddenFill xmlns:a14="http://schemas.microsoft.com/office/drawing/2010/main">
-                <a:solidFill>
-                  <a:srgbClr val="FFFFFF"/>
-                </a:solidFill>
-              </a14:hiddenFill>
-            </a:ext>
-          </a:extLst>
-        </p:spPr>
-      </p:pic>
+          <p:cNvPr id="2" name="Title 1"/>
+          <p:cNvSpPr>
+            <a:spLocks noGrp="1"/>
+          </p:cNvSpPr>
+          <p:nvPr>
+            <p:ph type="title"/>
+          </p:nvPr>
+        </p:nvSpPr>
+        <p:spPr/>
+        <p:txBody>
+          <a:bodyPr/>
+          <a:lstStyle/>
+          <a:p>
+            <a:r>
+              <a:rPr lang="en-US" dirty="0"/>
+              <a:t>What is DevOps?</a:t>
+            </a:r>
+          </a:p>
+        </p:txBody>
+      </p:sp>
+      <p:sp>
+        <p:nvSpPr>
+          <p:cNvPr id="3" name="Content Placeholder 2"/>
+          <p:cNvSpPr>
+            <a:spLocks noGrp="1"/>
+          </p:cNvSpPr>
+          <p:nvPr>
+            <p:ph idx="1"/>
+          </p:nvPr>
+        </p:nvSpPr>
+        <p:spPr/>
+        <p:txBody>
+          <a:bodyPr/>
+          <a:lstStyle/>
+          <a:p>
+            <a:pPr marL="0" indent="0">
+              <a:buNone/>
+            </a:pPr>
+            <a:r>
+              <a:rPr lang="en-US" dirty="0"/>
+              <a:t>“DevOps is the union of people, process, and products to enable continuous delivery of value to our end users.”</a:t>
+            </a:r>
+          </a:p>
+          <a:p>
+            <a:pPr algn="r">
+              <a:buFontTx/>
+              <a:buChar char="-"/>
+            </a:pPr>
+            <a:r>
+              <a:rPr lang="en-US" i="1" dirty="0"/>
+              <a:t>Donovan Brown</a:t>
+            </a:r>
+          </a:p>
+          <a:p>
+            <a:pPr marL="0" indent="0" algn="r">
+              <a:buNone/>
+            </a:pPr>
+            <a:r>
+              <a:rPr lang="en-US" i="1" dirty="0"/>
+              <a:t>Microsoft Principal DevOps PM</a:t>
+            </a:r>
+          </a:p>
+          <a:p>
+            <a:pPr marL="0" indent="0" algn="r">
+              <a:buNone/>
+            </a:pPr>
+            <a:r>
+              <a:rPr lang="en-US" sz="1800" dirty="0"/>
+              <a:t>From </a:t>
+            </a:r>
+            <a:r>
+              <a:rPr lang="en-US" sz="1800" dirty="0">
+                <a:hlinkClick r:id="rId2"/>
+              </a:rPr>
+              <a:t>http://donovanbrown.com/post/what-is-devops</a:t>
+            </a:r>
+            <a:endParaRPr lang="en-US" sz="1800" dirty="0"/>
+          </a:p>
+        </p:txBody>
+      </p:sp>
     </p:spTree>
     <p:extLst>
       <p:ext uri="{BB962C8B-B14F-4D97-AF65-F5344CB8AC3E}">
-        <p14:creationId xmlns:p14="http://schemas.microsoft.com/office/powerpoint/2010/main" val="1696789867"/>
+        <p14:creationId xmlns:p14="http://schemas.microsoft.com/office/powerpoint/2010/main" val="1659003174"/>
       </p:ext>
     </p:extLst>
   </p:cSld>
@@ -4507,211 +6690,67 @@
       </p:grpSpPr>
       <p:sp>
         <p:nvSpPr>
-          <p:cNvPr id="70" name="Rectangle 69"/>
-          <p:cNvSpPr>
-            <a:spLocks noGrp="1" noRot="1" noChangeAspect="1" noMove="1" noResize="1" noEditPoints="1" noAdjustHandles="1" noChangeArrowheads="1" noChangeShapeType="1" noTextEdit="1"/>
-          </p:cNvSpPr>
-          <p:nvPr>
-            <p:extLst>
-              <p:ext uri="{386F3935-93C4-4BCD-93E2-E3B085C9AB24}">
-                <p16:designElem xmlns:p16="http://schemas.microsoft.com/office/powerpoint/2015/main" val="1"/>
-              </p:ext>
-            </p:extLst>
-          </p:nvPr>
-        </p:nvSpPr>
-        <p:spPr>
-          <a:xfrm>
-            <a:off x="0" y="0"/>
-            <a:ext cx="12192000" cy="6858000"/>
-          </a:xfrm>
-          <a:prstGeom prst="rect">
-            <a:avLst/>
-          </a:prstGeom>
-          <a:solidFill>
-            <a:schemeClr val="bg1">
-              <a:lumMod val="75000"/>
-            </a:schemeClr>
-          </a:solidFill>
-          <a:ln>
-            <a:noFill/>
-          </a:ln>
-        </p:spPr>
-        <p:style>
-          <a:lnRef idx="2">
-            <a:schemeClr val="accent1">
-              <a:shade val="50000"/>
-            </a:schemeClr>
-          </a:lnRef>
-          <a:fillRef idx="1">
-            <a:schemeClr val="accent1"/>
-          </a:fillRef>
-          <a:effectRef idx="0">
-            <a:schemeClr val="accent1"/>
-          </a:effectRef>
-          <a:fontRef idx="minor">
-            <a:schemeClr val="lt1"/>
-          </a:fontRef>
-        </p:style>
-        <p:txBody>
-          <a:bodyPr rtlCol="0" anchor="ctr"/>
-          <a:lstStyle/>
-          <a:p>
-            <a:pPr algn="ctr"/>
-            <a:endParaRPr lang="en-US"/>
-          </a:p>
-        </p:txBody>
-      </p:sp>
-      <p:sp>
-        <p:nvSpPr>
-          <p:cNvPr id="72" name="Rectangle 71"/>
-          <p:cNvSpPr>
-            <a:spLocks noGrp="1" noRot="1" noChangeAspect="1" noMove="1" noResize="1" noEditPoints="1" noAdjustHandles="1" noChangeArrowheads="1" noChangeShapeType="1" noTextEdit="1"/>
-          </p:cNvSpPr>
-          <p:nvPr>
-            <p:extLst>
-              <p:ext uri="{386F3935-93C4-4BCD-93E2-E3B085C9AB24}">
-                <p16:designElem xmlns:p16="http://schemas.microsoft.com/office/powerpoint/2015/main" val="1"/>
-              </p:ext>
-            </p:extLst>
-          </p:nvPr>
-        </p:nvSpPr>
-        <p:spPr>
-          <a:xfrm>
-            <a:off x="477012" y="480060"/>
-            <a:ext cx="11237976" cy="5897880"/>
-          </a:xfrm>
-          <a:prstGeom prst="rect">
-            <a:avLst/>
-          </a:prstGeom>
-          <a:noFill/>
-          <a:ln>
-            <a:solidFill>
-              <a:schemeClr val="bg1"/>
-            </a:solidFill>
-          </a:ln>
-        </p:spPr>
-        <p:style>
-          <a:lnRef idx="2">
-            <a:schemeClr val="accent1">
-              <a:shade val="50000"/>
-            </a:schemeClr>
-          </a:lnRef>
-          <a:fillRef idx="1">
-            <a:schemeClr val="accent1"/>
-          </a:fillRef>
-          <a:effectRef idx="0">
-            <a:schemeClr val="accent1"/>
-          </a:effectRef>
-          <a:fontRef idx="minor">
-            <a:schemeClr val="lt1"/>
-          </a:fontRef>
-        </p:style>
-        <p:txBody>
-          <a:bodyPr rtlCol="0" anchor="ctr"/>
-          <a:lstStyle/>
-          <a:p>
-            <a:pPr algn="ctr"/>
-            <a:endParaRPr lang="en-US"/>
-          </a:p>
-        </p:txBody>
-      </p:sp>
-      <p:sp>
-        <p:nvSpPr>
-          <p:cNvPr id="74" name="Rectangle 73"/>
-          <p:cNvSpPr>
-            <a:spLocks noGrp="1" noRot="1" noChangeAspect="1" noMove="1" noResize="1" noEditPoints="1" noAdjustHandles="1" noChangeArrowheads="1" noChangeShapeType="1" noTextEdit="1"/>
-          </p:cNvSpPr>
-          <p:nvPr>
-            <p:extLst>
-              <p:ext uri="{386F3935-93C4-4BCD-93E2-E3B085C9AB24}">
-                <p16:designElem xmlns:p16="http://schemas.microsoft.com/office/powerpoint/2015/main" val="1"/>
-              </p:ext>
-            </p:extLst>
-          </p:nvPr>
-        </p:nvSpPr>
-        <p:spPr>
-          <a:xfrm>
-            <a:off x="643466" y="643468"/>
-            <a:ext cx="10905067" cy="5571066"/>
-          </a:xfrm>
-          <a:prstGeom prst="rect">
-            <a:avLst/>
-          </a:prstGeom>
-          <a:solidFill>
-            <a:srgbClr val="FFFFFF"/>
-          </a:solidFill>
-          <a:ln>
-            <a:noFill/>
-          </a:ln>
-        </p:spPr>
-        <p:style>
-          <a:lnRef idx="2">
-            <a:schemeClr val="accent1">
-              <a:shade val="50000"/>
-            </a:schemeClr>
-          </a:lnRef>
-          <a:fillRef idx="1">
-            <a:schemeClr val="accent1"/>
-          </a:fillRef>
-          <a:effectRef idx="0">
-            <a:schemeClr val="accent1"/>
-          </a:effectRef>
-          <a:fontRef idx="minor">
-            <a:schemeClr val="lt1"/>
-          </a:fontRef>
-        </p:style>
-        <p:txBody>
-          <a:bodyPr rtlCol="0" anchor="ctr"/>
-          <a:lstStyle/>
-          <a:p>
-            <a:pPr algn="ctr"/>
-            <a:endParaRPr lang="en-US"/>
-          </a:p>
-        </p:txBody>
-      </p:sp>
-      <p:pic>
-        <p:nvPicPr>
-          <p:cNvPr id="3074" name="Picture 2" descr="http://itrevolution.com/wp-content/uploads/2012/08/third-way-400x224.png"/>
-          <p:cNvPicPr>
-            <a:picLocks noChangeAspect="1" noChangeArrowheads="1"/>
-          </p:cNvPicPr>
-          <p:nvPr/>
-        </p:nvPicPr>
-        <p:blipFill rotWithShape="1">
-          <a:blip r:embed="rId2">
-            <a:extLst>
-              <a:ext uri="{28A0092B-C50C-407E-A947-70E740481C1C}">
-                <a14:useLocalDpi xmlns:a14="http://schemas.microsoft.com/office/drawing/2010/main" val="0"/>
-              </a:ext>
-            </a:extLst>
-          </a:blip>
-          <a:srcRect/>
-          <a:stretch/>
-        </p:blipFill>
-        <p:spPr bwMode="auto">
-          <a:xfrm>
-            <a:off x="1984569" y="1123527"/>
-            <a:ext cx="8222857" cy="4604800"/>
-          </a:xfrm>
-          <a:prstGeom prst="rect">
-            <a:avLst/>
-          </a:prstGeom>
-          <a:noFill/>
-          <a:extLst>
-            <a:ext uri="{909E8E84-426E-40DD-AFC4-6F175D3DCCD1}">
-              <a14:hiddenFill xmlns:a14="http://schemas.microsoft.com/office/drawing/2010/main">
-                <a:solidFill>
-                  <a:srgbClr val="FFFFFF"/>
-                </a:solidFill>
-              </a14:hiddenFill>
-            </a:ext>
-          </a:extLst>
-        </p:spPr>
-      </p:pic>
+          <p:cNvPr id="2" name="Title 1"/>
+          <p:cNvSpPr>
+            <a:spLocks noGrp="1"/>
+          </p:cNvSpPr>
+          <p:nvPr>
+            <p:ph type="title"/>
+          </p:nvPr>
+        </p:nvSpPr>
+        <p:spPr/>
+        <p:txBody>
+          <a:bodyPr/>
+          <a:lstStyle/>
+          <a:p>
+            <a:r>
+              <a:rPr lang="en-US" dirty="0"/>
+              <a:t>What is DevOps?</a:t>
+            </a:r>
+          </a:p>
+        </p:txBody>
+      </p:sp>
+      <p:sp>
+        <p:nvSpPr>
+          <p:cNvPr id="3" name="Content Placeholder 2"/>
+          <p:cNvSpPr>
+            <a:spLocks noGrp="1"/>
+          </p:cNvSpPr>
+          <p:nvPr>
+            <p:ph idx="1"/>
+          </p:nvPr>
+        </p:nvSpPr>
+        <p:spPr/>
+        <p:txBody>
+          <a:bodyPr/>
+          <a:lstStyle/>
+          <a:p>
+            <a:pPr marL="0" indent="0">
+              <a:buNone/>
+            </a:pPr>
+            <a:r>
+              <a:rPr lang="en-US" i="1" dirty="0"/>
+              <a:t>“It is very important to realize that DevOps is not a product.  You cannot buy DevOps and install it.  DevOps is not just automation or infrastructure as code.  DevOps is people following a process enabled by products to deliver value to our end users.”</a:t>
+            </a:r>
+          </a:p>
+          <a:p>
+            <a:pPr marL="0" indent="0" algn="r">
+              <a:buNone/>
+            </a:pPr>
+            <a:r>
+              <a:rPr lang="en-US" dirty="0"/>
+              <a:t>- Donovan Brown</a:t>
+            </a:r>
+          </a:p>
+          <a:p>
+            <a:endParaRPr lang="en-US" dirty="0"/>
+          </a:p>
+        </p:txBody>
+      </p:sp>
     </p:spTree>
     <p:extLst>
       <p:ext uri="{BB962C8B-B14F-4D97-AF65-F5344CB8AC3E}">
-        <p14:creationId xmlns:p14="http://schemas.microsoft.com/office/powerpoint/2010/main" val="937397400"/>
+        <p14:creationId xmlns:p14="http://schemas.microsoft.com/office/powerpoint/2010/main" val="2606710913"/>
       </p:ext>
     </p:extLst>
   </p:cSld>
@@ -5014,4 +7053,299 @@
     </a:ext>
   </a:extLst>
 </a:theme>
+</file>
+
+<file path=ppt/theme/theme2.xml><?xml version="1.0" encoding="utf-8"?>
+<a:theme xmlns:a="http://schemas.openxmlformats.org/drawingml/2006/main" name="Office Theme">
+  <a:themeElements>
+    <a:clrScheme name="Office">
+      <a:dk1>
+        <a:sysClr val="windowText" lastClr="000000"/>
+      </a:dk1>
+      <a:lt1>
+        <a:sysClr val="window" lastClr="FFFFFF"/>
+      </a:lt1>
+      <a:dk2>
+        <a:srgbClr val="44546A"/>
+      </a:dk2>
+      <a:lt2>
+        <a:srgbClr val="E7E6E6"/>
+      </a:lt2>
+      <a:accent1>
+        <a:srgbClr val="5B9BD5"/>
+      </a:accent1>
+      <a:accent2>
+        <a:srgbClr val="ED7D31"/>
+      </a:accent2>
+      <a:accent3>
+        <a:srgbClr val="A5A5A5"/>
+      </a:accent3>
+      <a:accent4>
+        <a:srgbClr val="FFC000"/>
+      </a:accent4>
+      <a:accent5>
+        <a:srgbClr val="4472C4"/>
+      </a:accent5>
+      <a:accent6>
+        <a:srgbClr val="70AD47"/>
+      </a:accent6>
+      <a:hlink>
+        <a:srgbClr val="0563C1"/>
+      </a:hlink>
+      <a:folHlink>
+        <a:srgbClr val="954F72"/>
+      </a:folHlink>
+    </a:clrScheme>
+    <a:fontScheme name="Office">
+      <a:majorFont>
+        <a:latin typeface="Calibri Light" panose="020F0302020204030204"/>
+        <a:ea typeface=""/>
+        <a:cs typeface=""/>
+        <a:font script="Jpan" typeface="游ゴシック Light"/>
+        <a:font script="Hang" typeface="맑은 고딕"/>
+        <a:font script="Hans" typeface="等线 Light"/>
+        <a:font script="Hant" typeface="新細明體"/>
+        <a:font script="Arab" typeface="Times New Roman"/>
+        <a:font script="Hebr" typeface="Times New Roman"/>
+        <a:font script="Thai" typeface="Angsana New"/>
+        <a:font script="Ethi" typeface="Nyala"/>
+        <a:font script="Beng" typeface="Vrinda"/>
+        <a:font script="Gujr" typeface="Shruti"/>
+        <a:font script="Khmr" typeface="MoolBoran"/>
+        <a:font script="Knda" typeface="Tunga"/>
+        <a:font script="Guru" typeface="Raavi"/>
+        <a:font script="Cans" typeface="Euphemia"/>
+        <a:font script="Cher" typeface="Plantagenet Cherokee"/>
+        <a:font script="Yiii" typeface="Microsoft Yi Baiti"/>
+        <a:font script="Tibt" typeface="Microsoft Himalaya"/>
+        <a:font script="Thaa" typeface="MV Boli"/>
+        <a:font script="Deva" typeface="Mangal"/>
+        <a:font script="Telu" typeface="Gautami"/>
+        <a:font script="Taml" typeface="Latha"/>
+        <a:font script="Syrc" typeface="Estrangelo Edessa"/>
+        <a:font script="Orya" typeface="Kalinga"/>
+        <a:font script="Mlym" typeface="Kartika"/>
+        <a:font script="Laoo" typeface="DokChampa"/>
+        <a:font script="Sinh" typeface="Iskoola Pota"/>
+        <a:font script="Mong" typeface="Mongolian Baiti"/>
+        <a:font script="Viet" typeface="Times New Roman"/>
+        <a:font script="Uigh" typeface="Microsoft Uighur"/>
+        <a:font script="Geor" typeface="Sylfaen"/>
+        <a:font script="Armn" typeface="Arial"/>
+        <a:font script="Bugi" typeface="Leelawadee UI"/>
+        <a:font script="Bopo" typeface="Microsoft JhengHei"/>
+        <a:font script="Java" typeface="Javanese Text"/>
+        <a:font script="Lisu" typeface="Segoe UI"/>
+        <a:font script="Mymr" typeface="Myanmar Text"/>
+        <a:font script="Nkoo" typeface="Ebrima"/>
+        <a:font script="Olck" typeface="Nirmala UI"/>
+        <a:font script="Osma" typeface="Ebrima"/>
+        <a:font script="Phag" typeface="Phagspa"/>
+        <a:font script="Syrn" typeface="Estrangelo Edessa"/>
+        <a:font script="Syrj" typeface="Estrangelo Edessa"/>
+        <a:font script="Syre" typeface="Estrangelo Edessa"/>
+        <a:font script="Sora" typeface="Nirmala UI"/>
+        <a:font script="Tale" typeface="Microsoft Tai Le"/>
+        <a:font script="Talu" typeface="Microsoft New Tai Lue"/>
+        <a:font script="Tfng" typeface="Ebrima"/>
+      </a:majorFont>
+      <a:minorFont>
+        <a:latin typeface="Calibri" panose="020F0502020204030204"/>
+        <a:ea typeface=""/>
+        <a:cs typeface=""/>
+        <a:font script="Jpan" typeface="游ゴシック"/>
+        <a:font script="Hang" typeface="맑은 고딕"/>
+        <a:font script="Hans" typeface="等线"/>
+        <a:font script="Hant" typeface="新細明體"/>
+        <a:font script="Arab" typeface="Arial"/>
+        <a:font script="Hebr" typeface="Arial"/>
+        <a:font script="Thai" typeface="Cordia New"/>
+        <a:font script="Ethi" typeface="Nyala"/>
+        <a:font script="Beng" typeface="Vrinda"/>
+        <a:font script="Gujr" typeface="Shruti"/>
+        <a:font script="Khmr" typeface="DaunPenh"/>
+        <a:font script="Knda" typeface="Tunga"/>
+        <a:font script="Guru" typeface="Raavi"/>
+        <a:font script="Cans" typeface="Euphemia"/>
+        <a:font script="Cher" typeface="Plantagenet Cherokee"/>
+        <a:font script="Yiii" typeface="Microsoft Yi Baiti"/>
+        <a:font script="Tibt" typeface="Microsoft Himalaya"/>
+        <a:font script="Thaa" typeface="MV Boli"/>
+        <a:font script="Deva" typeface="Mangal"/>
+        <a:font script="Telu" typeface="Gautami"/>
+        <a:font script="Taml" typeface="Latha"/>
+        <a:font script="Syrc" typeface="Estrangelo Edessa"/>
+        <a:font script="Orya" typeface="Kalinga"/>
+        <a:font script="Mlym" typeface="Kartika"/>
+        <a:font script="Laoo" typeface="DokChampa"/>
+        <a:font script="Sinh" typeface="Iskoola Pota"/>
+        <a:font script="Mong" typeface="Mongolian Baiti"/>
+        <a:font script="Viet" typeface="Arial"/>
+        <a:font script="Uigh" typeface="Microsoft Uighur"/>
+        <a:font script="Geor" typeface="Sylfaen"/>
+        <a:font script="Armn" typeface="Arial"/>
+        <a:font script="Bugi" typeface="Leelawadee UI"/>
+        <a:font script="Bopo" typeface="Microsoft JhengHei"/>
+        <a:font script="Java" typeface="Javanese Text"/>
+        <a:font script="Lisu" typeface="Segoe UI"/>
+        <a:font script="Mymr" typeface="Myanmar Text"/>
+        <a:font script="Nkoo" typeface="Ebrima"/>
+        <a:font script="Olck" typeface="Nirmala UI"/>
+        <a:font script="Osma" typeface="Ebrima"/>
+        <a:font script="Phag" typeface="Phagspa"/>
+        <a:font script="Syrn" typeface="Estrangelo Edessa"/>
+        <a:font script="Syrj" typeface="Estrangelo Edessa"/>
+        <a:font script="Syre" typeface="Estrangelo Edessa"/>
+        <a:font script="Sora" typeface="Nirmala UI"/>
+        <a:font script="Tale" typeface="Microsoft Tai Le"/>
+        <a:font script="Talu" typeface="Microsoft New Tai Lue"/>
+        <a:font script="Tfng" typeface="Ebrima"/>
+      </a:minorFont>
+    </a:fontScheme>
+    <a:fmtScheme name="Office">
+      <a:fillStyleLst>
+        <a:solidFill>
+          <a:schemeClr val="phClr"/>
+        </a:solidFill>
+        <a:gradFill rotWithShape="1">
+          <a:gsLst>
+            <a:gs pos="0">
+              <a:schemeClr val="phClr">
+                <a:lumMod val="110000"/>
+                <a:satMod val="105000"/>
+                <a:tint val="67000"/>
+              </a:schemeClr>
+            </a:gs>
+            <a:gs pos="50000">
+              <a:schemeClr val="phClr">
+                <a:lumMod val="105000"/>
+                <a:satMod val="103000"/>
+                <a:tint val="73000"/>
+              </a:schemeClr>
+            </a:gs>
+            <a:gs pos="100000">
+              <a:schemeClr val="phClr">
+                <a:lumMod val="105000"/>
+                <a:satMod val="109000"/>
+                <a:tint val="81000"/>
+              </a:schemeClr>
+            </a:gs>
+          </a:gsLst>
+          <a:lin ang="5400000" scaled="0"/>
+        </a:gradFill>
+        <a:gradFill rotWithShape="1">
+          <a:gsLst>
+            <a:gs pos="0">
+              <a:schemeClr val="phClr">
+                <a:satMod val="103000"/>
+                <a:lumMod val="102000"/>
+                <a:tint val="94000"/>
+              </a:schemeClr>
+            </a:gs>
+            <a:gs pos="50000">
+              <a:schemeClr val="phClr">
+                <a:satMod val="110000"/>
+                <a:lumMod val="100000"/>
+                <a:shade val="100000"/>
+              </a:schemeClr>
+            </a:gs>
+            <a:gs pos="100000">
+              <a:schemeClr val="phClr">
+                <a:lumMod val="99000"/>
+                <a:satMod val="120000"/>
+                <a:shade val="78000"/>
+              </a:schemeClr>
+            </a:gs>
+          </a:gsLst>
+          <a:lin ang="5400000" scaled="0"/>
+        </a:gradFill>
+      </a:fillStyleLst>
+      <a:lnStyleLst>
+        <a:ln w="6350" cap="flat" cmpd="sng" algn="ctr">
+          <a:solidFill>
+            <a:schemeClr val="phClr"/>
+          </a:solidFill>
+          <a:prstDash val="solid"/>
+          <a:miter lim="800000"/>
+        </a:ln>
+        <a:ln w="12700" cap="flat" cmpd="sng" algn="ctr">
+          <a:solidFill>
+            <a:schemeClr val="phClr"/>
+          </a:solidFill>
+          <a:prstDash val="solid"/>
+          <a:miter lim="800000"/>
+        </a:ln>
+        <a:ln w="19050" cap="flat" cmpd="sng" algn="ctr">
+          <a:solidFill>
+            <a:schemeClr val="phClr"/>
+          </a:solidFill>
+          <a:prstDash val="solid"/>
+          <a:miter lim="800000"/>
+        </a:ln>
+      </a:lnStyleLst>
+      <a:effectStyleLst>
+        <a:effectStyle>
+          <a:effectLst/>
+        </a:effectStyle>
+        <a:effectStyle>
+          <a:effectLst/>
+        </a:effectStyle>
+        <a:effectStyle>
+          <a:effectLst>
+            <a:outerShdw blurRad="57150" dist="19050" dir="5400000" algn="ctr" rotWithShape="0">
+              <a:srgbClr val="000000">
+                <a:alpha val="63000"/>
+              </a:srgbClr>
+            </a:outerShdw>
+          </a:effectLst>
+        </a:effectStyle>
+      </a:effectStyleLst>
+      <a:bgFillStyleLst>
+        <a:solidFill>
+          <a:schemeClr val="phClr"/>
+        </a:solidFill>
+        <a:solidFill>
+          <a:schemeClr val="phClr">
+            <a:tint val="95000"/>
+            <a:satMod val="170000"/>
+          </a:schemeClr>
+        </a:solidFill>
+        <a:gradFill rotWithShape="1">
+          <a:gsLst>
+            <a:gs pos="0">
+              <a:schemeClr val="phClr">
+                <a:tint val="93000"/>
+                <a:satMod val="150000"/>
+                <a:shade val="98000"/>
+                <a:lumMod val="102000"/>
+              </a:schemeClr>
+            </a:gs>
+            <a:gs pos="50000">
+              <a:schemeClr val="phClr">
+                <a:tint val="98000"/>
+                <a:satMod val="130000"/>
+                <a:shade val="90000"/>
+                <a:lumMod val="103000"/>
+              </a:schemeClr>
+            </a:gs>
+            <a:gs pos="100000">
+              <a:schemeClr val="phClr">
+                <a:shade val="63000"/>
+                <a:satMod val="120000"/>
+              </a:schemeClr>
+            </a:gs>
+          </a:gsLst>
+          <a:lin ang="5400000" scaled="0"/>
+        </a:gradFill>
+      </a:bgFillStyleLst>
+    </a:fmtScheme>
+  </a:themeElements>
+  <a:objectDefaults/>
+  <a:extraClrSchemeLst/>
+  <a:extLst>
+    <a:ext uri="{05A4C25C-085E-4340-85A3-A5531E510DB2}">
+      <thm15:themeFamily xmlns:thm15="http://schemas.microsoft.com/office/thememl/2012/main" name="Office Theme" id="{62F939B6-93AF-4DB8-9C6B-D6C7DFDC589F}" vid="{4A3C46E8-61CC-4603-A589-7422A47A8E4A}"/>
+    </a:ext>
+  </a:extLst>
+</a:theme>
 </file>
</xml_diff>

<commit_message>
updated slides based on Stephanie's comments
</commit_message>
<xml_diff>
--- a/Section 1- Intro to DevOps/1.1IntroDatabaseDevOps.pptx
+++ b/Section 1- Intro to DevOps/1.1IntroDatabaseDevOps.pptx
@@ -227,7 +227,7 @@
           <a:p>
             <a:fld id="{B6492822-2C9D-4185-9041-FF2754FD057B}" type="datetimeFigureOut">
               <a:rPr lang="en-US" smtClean="0"/>
-              <a:t>4/2/2017</a:t>
+              <a:t>4/4/2017</a:t>
             </a:fld>
             <a:endParaRPr lang="en-US"/>
           </a:p>
@@ -805,7 +805,6 @@
               <a:rPr lang="en-US" dirty="0"/>
               <a:t>Note that we will explore the issues of development related to relational databases that typically allow various types of code inside of the platform. Various other types of databases, such as document databases, graph databases, etc., are not discussed in this course.</a:t>
             </a:r>
-            <a:endParaRPr lang="en-US" dirty="0"/>
           </a:p>
         </p:txBody>
       </p:sp>
@@ -1045,7 +1044,6 @@
               <a:rPr lang="en-US" dirty="0"/>
               <a:t>”. This is a more descriptive name and a common type of refactoring we might do in a C# method, but one that can be problematic for databases.</a:t>
             </a:r>
-            <a:endParaRPr lang="en-US" dirty="0"/>
           </a:p>
         </p:txBody>
       </p:sp>
@@ -1421,15 +1419,7 @@
           <a:p>
             <a:r>
               <a:rPr lang="en-US" dirty="0"/>
-              <a:t>A migration based development approach requires that as developers make changes to their databases, they track each change (or set of changes) in a script. These scripts are then executed, or replayed against the downstream databases in the same order they were executed against the development systems. In this way, we can ensure that we don’t miss any of the changes made in the development environment, and we can easily move any database from one version to the next by applying the </a:t>
-            </a:r>
-            <a:r>
-              <a:rPr lang="en-US" dirty="0" err="1"/>
-              <a:t>corret</a:t>
-            </a:r>
-            <a:r>
-              <a:rPr lang="en-US" dirty="0"/>
-              <a:t> number of migration scripts.</a:t>
+              <a:t>A migration based development approach requires that as developers make changes to their databases, they track each change (or set of changes) in a script. These scripts are then executed, or replayed against the downstream databases in the same order they were executed against the development systems. In this way, we can ensure that we don’t miss any of the changes made in the development environment, and we can easily move any database from one version to the next by applying the correct number of migration scripts.</a:t>
             </a:r>
           </a:p>
           <a:p>
@@ -1483,7 +1473,6 @@
               <a:rPr lang="en-US" dirty="0"/>
               <a:t>Let’s see how this works in practice. </a:t>
             </a:r>
-            <a:endParaRPr lang="en-US" dirty="0"/>
           </a:p>
         </p:txBody>
       </p:sp>
@@ -2217,7 +2206,6 @@
               <a:rPr lang="en-US" dirty="0"/>
               <a:t>That's the goal of DevOps, and ultimately it involves as much a change in people and process as it does using some sort of tool or product. In fact, the people and process change is going to be more important, and certainly going to take longer than implementing any tool.</a:t>
             </a:r>
-            <a:endParaRPr lang="en-US" dirty="0"/>
           </a:p>
         </p:txBody>
       </p:sp>
@@ -2328,7 +2316,6 @@
               <a:rPr lang="en-US" dirty="0"/>
               <a:t> to manage our code or deploying automatically with VSTS, there important concept is that you understand how to manage code or deploy code.</a:t>
             </a:r>
-            <a:endParaRPr lang="en-US" dirty="0"/>
           </a:p>
         </p:txBody>
       </p:sp>
@@ -2424,7 +2411,6 @@
               <a:rPr lang="en-US" dirty="0"/>
               <a:t> and researched best known for authoring The Phoenix Project and the DevOps Handbook. He postulates that these principles should guide you in your DevOps journey. </a:t>
             </a:r>
-            <a:endParaRPr lang="en-US" dirty="0"/>
           </a:p>
         </p:txBody>
       </p:sp>
@@ -2619,7 +2605,6 @@
               <a:rPr lang="en-US" dirty="0"/>
               <a:t> for making change in production to improve the performance of code, but not telling developers why. Not only can this cause potential conflicts with future deployments, but this also doesn't help developers learn to produce better database code. We want to ensure in the second way that developers get the feedback they need to raise the quality of their software over time.</a:t>
             </a:r>
-            <a:endParaRPr lang="en-US" dirty="0"/>
           </a:p>
         </p:txBody>
       </p:sp>
@@ -2715,7 +2700,6 @@
               <a:rPr lang="en-US" dirty="0"/>
               <a:t>. However, we always learn, and ensure others learn, from our efforts. </a:t>
             </a:r>
-            <a:endParaRPr lang="en-US" dirty="0"/>
           </a:p>
         </p:txBody>
       </p:sp>
@@ -2820,7 +2804,6 @@
               <a:rPr lang="en-US" dirty="0"/>
               <a:t>That's what we'll cover in this course. The rest of the technical side, monitoring, backups, and provisioning new systems is important, but it won't be covered here.</a:t>
             </a:r>
-            <a:endParaRPr lang="en-US" dirty="0"/>
           </a:p>
         </p:txBody>
       </p:sp>
@@ -3159,7 +3142,7 @@
           <a:p>
             <a:fld id="{2402ECA0-9BE0-424F-B302-B69C667DF220}" type="datetimeFigureOut">
               <a:rPr lang="en-US" smtClean="0"/>
-              <a:t>4/2/2017</a:t>
+              <a:t>4/4/2017</a:t>
             </a:fld>
             <a:endParaRPr lang="en-US"/>
           </a:p>
@@ -3327,7 +3310,7 @@
           <a:p>
             <a:fld id="{2402ECA0-9BE0-424F-B302-B69C667DF220}" type="datetimeFigureOut">
               <a:rPr lang="en-US" smtClean="0"/>
-              <a:t>4/2/2017</a:t>
+              <a:t>4/4/2017</a:t>
             </a:fld>
             <a:endParaRPr lang="en-US"/>
           </a:p>
@@ -3505,7 +3488,7 @@
           <a:p>
             <a:fld id="{2402ECA0-9BE0-424F-B302-B69C667DF220}" type="datetimeFigureOut">
               <a:rPr lang="en-US" smtClean="0"/>
-              <a:t>4/2/2017</a:t>
+              <a:t>4/4/2017</a:t>
             </a:fld>
             <a:endParaRPr lang="en-US"/>
           </a:p>
@@ -3673,7 +3656,7 @@
           <a:p>
             <a:fld id="{2402ECA0-9BE0-424F-B302-B69C667DF220}" type="datetimeFigureOut">
               <a:rPr lang="en-US" smtClean="0"/>
-              <a:t>4/2/2017</a:t>
+              <a:t>4/4/2017</a:t>
             </a:fld>
             <a:endParaRPr lang="en-US"/>
           </a:p>
@@ -3918,7 +3901,7 @@
           <a:p>
             <a:fld id="{2402ECA0-9BE0-424F-B302-B69C667DF220}" type="datetimeFigureOut">
               <a:rPr lang="en-US" smtClean="0"/>
-              <a:t>4/2/2017</a:t>
+              <a:t>4/4/2017</a:t>
             </a:fld>
             <a:endParaRPr lang="en-US"/>
           </a:p>
@@ -4147,7 +4130,7 @@
           <a:p>
             <a:fld id="{2402ECA0-9BE0-424F-B302-B69C667DF220}" type="datetimeFigureOut">
               <a:rPr lang="en-US" smtClean="0"/>
-              <a:t>4/2/2017</a:t>
+              <a:t>4/4/2017</a:t>
             </a:fld>
             <a:endParaRPr lang="en-US"/>
           </a:p>
@@ -4511,7 +4494,7 @@
           <a:p>
             <a:fld id="{2402ECA0-9BE0-424F-B302-B69C667DF220}" type="datetimeFigureOut">
               <a:rPr lang="en-US" smtClean="0"/>
-              <a:t>4/2/2017</a:t>
+              <a:t>4/4/2017</a:t>
             </a:fld>
             <a:endParaRPr lang="en-US"/>
           </a:p>
@@ -4628,7 +4611,7 @@
           <a:p>
             <a:fld id="{2402ECA0-9BE0-424F-B302-B69C667DF220}" type="datetimeFigureOut">
               <a:rPr lang="en-US" smtClean="0"/>
-              <a:t>4/2/2017</a:t>
+              <a:t>4/4/2017</a:t>
             </a:fld>
             <a:endParaRPr lang="en-US"/>
           </a:p>
@@ -4723,7 +4706,7 @@
           <a:p>
             <a:fld id="{2402ECA0-9BE0-424F-B302-B69C667DF220}" type="datetimeFigureOut">
               <a:rPr lang="en-US" smtClean="0"/>
-              <a:t>4/2/2017</a:t>
+              <a:t>4/4/2017</a:t>
             </a:fld>
             <a:endParaRPr lang="en-US"/>
           </a:p>
@@ -4998,7 +4981,7 @@
           <a:p>
             <a:fld id="{2402ECA0-9BE0-424F-B302-B69C667DF220}" type="datetimeFigureOut">
               <a:rPr lang="en-US" smtClean="0"/>
-              <a:t>4/2/2017</a:t>
+              <a:t>4/4/2017</a:t>
             </a:fld>
             <a:endParaRPr lang="en-US"/>
           </a:p>
@@ -5250,7 +5233,7 @@
           <a:p>
             <a:fld id="{2402ECA0-9BE0-424F-B302-B69C667DF220}" type="datetimeFigureOut">
               <a:rPr lang="en-US" smtClean="0"/>
-              <a:t>4/2/2017</a:t>
+              <a:t>4/4/2017</a:t>
             </a:fld>
             <a:endParaRPr lang="en-US"/>
           </a:p>
@@ -5461,7 +5444,7 @@
           <a:p>
             <a:fld id="{2402ECA0-9BE0-424F-B302-B69C667DF220}" type="datetimeFigureOut">
               <a:rPr lang="en-US" smtClean="0"/>
-              <a:t>4/2/2017</a:t>
+              <a:t>4/4/2017</a:t>
             </a:fld>
             <a:endParaRPr lang="en-US"/>
           </a:p>
@@ -10362,13 +10345,6 @@
             </a:r>
           </a:p>
           <a:p>
-            <a:pPr lvl="1"/>
-            <a:r>
-              <a:rPr lang="en-US" dirty="0"/>
-              <a:t>Simplicity</a:t>
-            </a:r>
-          </a:p>
-          <a:p>
             <a:r>
               <a:rPr lang="en-US" dirty="0"/>
               <a:t>Disadvantages</a:t>
@@ -10606,19 +10582,19 @@
           <a:p>
             <a:r>
               <a:rPr lang="en-US" dirty="0"/>
-              <a:t>All changes made to a database are tracked as they are made.</a:t>
-            </a:r>
-          </a:p>
-          <a:p>
-            <a:r>
-              <a:rPr lang="en-US" dirty="0"/>
-              <a:t>Changes are ordered and executed in the same order on downstream environments</a:t>
-            </a:r>
-          </a:p>
-          <a:p>
-            <a:r>
-              <a:rPr lang="en-US" dirty="0"/>
-              <a:t>The actual code a developer executes is replayed in downstream environments.</a:t>
+              <a:t>All changes made to a database are tracked as they are made with the scripts stored in a VCS.</a:t>
+            </a:r>
+          </a:p>
+          <a:p>
+            <a:r>
+              <a:rPr lang="en-US" dirty="0"/>
+              <a:t>Change scripts are ordered and executed in the same order on downstream environments as they were in development</a:t>
+            </a:r>
+          </a:p>
+          <a:p>
+            <a:r>
+              <a:rPr lang="en-US" dirty="0"/>
+              <a:t>The actual code a developer executes is replayed in downstream environments without be rewritten or generated later</a:t>
             </a:r>
           </a:p>
         </p:txBody>
@@ -10735,6 +10711,18 @@
               <a:rPr lang="en-US" dirty="0"/>
               <a:t>Lots of scripts may need to be run, lengthening deployment</a:t>
             </a:r>
+          </a:p>
+          <a:p>
+            <a:pPr lvl="1"/>
+            <a:r>
+              <a:rPr lang="en-US" dirty="0"/>
+              <a:t>Production drift can cause lots </a:t>
+            </a:r>
+            <a:r>
+              <a:rPr lang="en-US"/>
+              <a:t>of issues.</a:t>
+            </a:r>
+            <a:endParaRPr lang="en-US" dirty="0"/>
           </a:p>
         </p:txBody>
       </p:sp>
@@ -11975,6 +11963,20 @@
             <a:r>
               <a:rPr lang="en-US" dirty="0"/>
               <a:t>Develop an automated release process that deploys database changes</a:t>
+            </a:r>
+          </a:p>
+          <a:p>
+            <a:pPr lvl="1"/>
+            <a:r>
+              <a:rPr lang="en-US" dirty="0"/>
+              <a:t>Understand the use of branching and merging for database code</a:t>
+            </a:r>
+          </a:p>
+          <a:p>
+            <a:pPr lvl="1"/>
+            <a:r>
+              <a:rPr lang="en-US" dirty="0"/>
+              <a:t>Instrument and monitor the database after deployment</a:t>
             </a:r>
           </a:p>
         </p:txBody>

</xml_diff>